<commit_message>
Uitvoering - demo - besluit
</commit_message>
<xml_diff>
--- a/Scrum Artifacts/Sprint5/IT-Projectwerk 2022.pptx
+++ b/Scrum Artifacts/Sprint5/IT-Projectwerk 2022.pptx
@@ -348,7 +348,7 @@
           <a:p>
             <a:fld id="{DE0F2AED-0ED5-49A6-B062-0BE42E986736}" type="datetimeFigureOut">
               <a:rPr lang="nl-BE" smtClean="0"/>
-              <a:t>11/06/2022</a:t>
+              <a:t>12/06/2022</a:t>
             </a:fld>
             <a:endParaRPr lang="nl-BE"/>
           </a:p>
@@ -556,7 +556,7 @@
           <a:p>
             <a:fld id="{DE0F2AED-0ED5-49A6-B062-0BE42E986736}" type="datetimeFigureOut">
               <a:rPr lang="nl-BE" smtClean="0"/>
-              <a:t>11/06/2022</a:t>
+              <a:t>12/06/2022</a:t>
             </a:fld>
             <a:endParaRPr lang="nl-BE"/>
           </a:p>
@@ -812,7 +812,7 @@
           <a:p>
             <a:fld id="{DE0F2AED-0ED5-49A6-B062-0BE42E986736}" type="datetimeFigureOut">
               <a:rPr lang="nl-BE" smtClean="0"/>
-              <a:t>11/06/2022</a:t>
+              <a:t>12/06/2022</a:t>
             </a:fld>
             <a:endParaRPr lang="nl-BE"/>
           </a:p>
@@ -986,7 +986,7 @@
           <a:p>
             <a:fld id="{DE0F2AED-0ED5-49A6-B062-0BE42E986736}" type="datetimeFigureOut">
               <a:rPr lang="nl-BE" smtClean="0"/>
-              <a:t>11/06/2022</a:t>
+              <a:t>12/06/2022</a:t>
             </a:fld>
             <a:endParaRPr lang="nl-BE"/>
           </a:p>
@@ -1329,7 +1329,7 @@
           <a:p>
             <a:fld id="{DE0F2AED-0ED5-49A6-B062-0BE42E986736}" type="datetimeFigureOut">
               <a:rPr lang="nl-BE" smtClean="0"/>
-              <a:t>11/06/2022</a:t>
+              <a:t>12/06/2022</a:t>
             </a:fld>
             <a:endParaRPr lang="nl-BE"/>
           </a:p>
@@ -1604,7 +1604,7 @@
           <a:p>
             <a:fld id="{DE0F2AED-0ED5-49A6-B062-0BE42E986736}" type="datetimeFigureOut">
               <a:rPr lang="nl-BE" smtClean="0"/>
-              <a:t>11/06/2022</a:t>
+              <a:t>12/06/2022</a:t>
             </a:fld>
             <a:endParaRPr lang="nl-BE"/>
           </a:p>
@@ -1983,7 +1983,7 @@
           <a:p>
             <a:fld id="{DE0F2AED-0ED5-49A6-B062-0BE42E986736}" type="datetimeFigureOut">
               <a:rPr lang="nl-BE" smtClean="0"/>
-              <a:t>11/06/2022</a:t>
+              <a:t>12/06/2022</a:t>
             </a:fld>
             <a:endParaRPr lang="nl-BE"/>
           </a:p>
@@ -2101,7 +2101,7 @@
           <a:p>
             <a:fld id="{DE0F2AED-0ED5-49A6-B062-0BE42E986736}" type="datetimeFigureOut">
               <a:rPr lang="nl-BE" smtClean="0"/>
-              <a:t>11/06/2022</a:t>
+              <a:t>12/06/2022</a:t>
             </a:fld>
             <a:endParaRPr lang="nl-BE"/>
           </a:p>
@@ -2272,7 +2272,7 @@
           <a:p>
             <a:fld id="{DE0F2AED-0ED5-49A6-B062-0BE42E986736}" type="datetimeFigureOut">
               <a:rPr lang="nl-BE" smtClean="0"/>
-              <a:t>11/06/2022</a:t>
+              <a:t>12/06/2022</a:t>
             </a:fld>
             <a:endParaRPr lang="nl-BE"/>
           </a:p>
@@ -2626,7 +2626,7 @@
           <a:p>
             <a:fld id="{DE0F2AED-0ED5-49A6-B062-0BE42E986736}" type="datetimeFigureOut">
               <a:rPr lang="nl-BE" smtClean="0"/>
-              <a:t>11/06/2022</a:t>
+              <a:t>12/06/2022</a:t>
             </a:fld>
             <a:endParaRPr lang="nl-BE"/>
           </a:p>
@@ -3008,7 +3008,7 @@
           <a:p>
             <a:fld id="{DE0F2AED-0ED5-49A6-B062-0BE42E986736}" type="datetimeFigureOut">
               <a:rPr lang="nl-BE" smtClean="0"/>
-              <a:t>11/06/2022</a:t>
+              <a:t>12/06/2022</a:t>
             </a:fld>
             <a:endParaRPr lang="nl-BE"/>
           </a:p>
@@ -3295,7 +3295,7 @@
           <a:p>
             <a:fld id="{DE0F2AED-0ED5-49A6-B062-0BE42E986736}" type="datetimeFigureOut">
               <a:rPr lang="nl-BE" smtClean="0"/>
-              <a:t>11/06/2022</a:t>
+              <a:t>12/06/2022</a:t>
             </a:fld>
             <a:endParaRPr lang="nl-BE"/>
           </a:p>
@@ -3946,7 +3946,23 @@
           <a:bodyPr/>
           <a:lstStyle/>
           <a:p>
-            <a:endParaRPr lang="nl-BE"/>
+            <a:r>
+              <a:rPr lang="nl-BE" dirty="0" smtClean="0"/>
+              <a:t>Script</a:t>
+            </a:r>
+          </a:p>
+          <a:p>
+            <a:r>
+              <a:rPr lang="nl-BE" dirty="0" smtClean="0"/>
+              <a:t>PXE-boot</a:t>
+            </a:r>
+          </a:p>
+          <a:p>
+            <a:r>
+              <a:rPr lang="nl-BE" dirty="0" smtClean="0"/>
+              <a:t>Docker</a:t>
+            </a:r>
+            <a:endParaRPr lang="nl-BE" dirty="0"/>
           </a:p>
         </p:txBody>
       </p:sp>
@@ -4029,7 +4045,29 @@
           <a:bodyPr/>
           <a:lstStyle/>
           <a:p>
-            <a:endParaRPr lang="nl-BE"/>
+            <a:r>
+              <a:rPr lang="nl-BE" dirty="0" smtClean="0"/>
+              <a:t>Product</a:t>
+            </a:r>
+          </a:p>
+          <a:p>
+            <a:r>
+              <a:rPr lang="nl-BE" dirty="0" smtClean="0"/>
+              <a:t>Sterke punten</a:t>
+            </a:r>
+          </a:p>
+          <a:p>
+            <a:r>
+              <a:rPr lang="nl-BE" dirty="0" smtClean="0"/>
+              <a:t>Werkpunten</a:t>
+            </a:r>
+          </a:p>
+          <a:p>
+            <a:r>
+              <a:rPr lang="nl-BE" smtClean="0"/>
+              <a:t>Revisie</a:t>
+            </a:r>
+            <a:endParaRPr lang="nl-BE" dirty="0"/>
           </a:p>
         </p:txBody>
       </p:sp>
@@ -4460,7 +4498,7 @@
                 <a16:creationId xmlns:a16="http://schemas.microsoft.com/office/drawing/2014/main" id="{284B70D5-875B-433D-BDBD-1522A85D6C1D}"/>
               </a:ext>
               <a:ext uri="{C183D7F6-B498-43B3-948B-1728B52AA6E4}">
-                <adec:decorative xmlns:adec="http://schemas.microsoft.com/office/drawing/2017/decorative" val="1"/>
+                <adec:decorative xmlns:adec="http://schemas.microsoft.com/office/drawing/2017/decorative" xmlns="" val="1"/>
               </a:ext>
             </a:extLst>
           </p:cNvPr>
@@ -4585,7 +4623,7 @@
                 <a16:creationId xmlns:a16="http://schemas.microsoft.com/office/drawing/2014/main" id="{C947DF4A-614C-4B4C-8B80-E5B9D8E8CFED}"/>
               </a:ext>
               <a:ext uri="{C183D7F6-B498-43B3-948B-1728B52AA6E4}">
-                <adec:decorative xmlns:adec="http://schemas.microsoft.com/office/drawing/2017/decorative" val="1"/>
+                <adec:decorative xmlns:adec="http://schemas.microsoft.com/office/drawing/2017/decorative" xmlns="" val="1"/>
               </a:ext>
             </a:extLst>
           </p:cNvPr>
@@ -4824,7 +4862,7 @@
                 <a16:creationId xmlns:a16="http://schemas.microsoft.com/office/drawing/2014/main" id="{1E299956-A9E7-4FC1-A0B1-D590CA9730E8}"/>
               </a:ext>
               <a:ext uri="{C183D7F6-B498-43B3-948B-1728B52AA6E4}">
-                <adec:decorative xmlns:adec="http://schemas.microsoft.com/office/drawing/2017/decorative" val="1"/>
+                <adec:decorative xmlns:adec="http://schemas.microsoft.com/office/drawing/2017/decorative" xmlns="" val="1"/>
               </a:ext>
             </a:extLst>
           </p:cNvPr>
@@ -4879,7 +4917,7 @@
                 <a16:creationId xmlns:a16="http://schemas.microsoft.com/office/drawing/2014/main" id="{17FC539C-B783-4B03-9F9E-D13430F3F64F}"/>
               </a:ext>
               <a:ext uri="{C183D7F6-B498-43B3-948B-1728B52AA6E4}">
-                <adec:decorative xmlns:adec="http://schemas.microsoft.com/office/drawing/2017/decorative" val="1"/>
+                <adec:decorative xmlns:adec="http://schemas.microsoft.com/office/drawing/2017/decorative" xmlns="" val="1"/>
               </a:ext>
             </a:extLst>
           </p:cNvPr>
@@ -5524,7 +5562,35 @@
           <a:bodyPr/>
           <a:lstStyle/>
           <a:p>
-            <a:endParaRPr lang="nl-BE"/>
+            <a:r>
+              <a:rPr lang="nl-BE" dirty="0" err="1" smtClean="0"/>
+              <a:t>Github</a:t>
+            </a:r>
+            <a:endParaRPr lang="nl-BE" dirty="0" smtClean="0"/>
+          </a:p>
+          <a:p>
+            <a:r>
+              <a:rPr lang="nl-BE" dirty="0" smtClean="0"/>
+              <a:t>Visio</a:t>
+            </a:r>
+            <a:endParaRPr lang="nl-BE" dirty="0"/>
+          </a:p>
+          <a:p>
+            <a:r>
+              <a:rPr lang="nl-BE" dirty="0" smtClean="0"/>
+              <a:t>Python3</a:t>
+            </a:r>
+          </a:p>
+          <a:p>
+            <a:r>
+              <a:rPr lang="nl-BE" dirty="0" err="1" smtClean="0"/>
+              <a:t>Notepad</a:t>
+            </a:r>
+            <a:r>
+              <a:rPr lang="nl-BE" dirty="0" smtClean="0"/>
+              <a:t>++</a:t>
+            </a:r>
+            <a:endParaRPr lang="nl-BE" dirty="0"/>
           </a:p>
         </p:txBody>
       </p:sp>

</xml_diff>

<commit_message>
powerpoint met screenshots en andere opmaak
</commit_message>
<xml_diff>
--- a/Scrum Artifacts/Sprint5/IT-Projectwerk 2022.pptx
+++ b/Scrum Artifacts/Sprint5/IT-Projectwerk 2022.pptx
@@ -2,10 +2,10 @@
 <file path=ppt/presentation.xml><?xml version="1.0" encoding="utf-8"?>
 <p:presentation xmlns:a="http://schemas.openxmlformats.org/drawingml/2006/main" xmlns:r="http://schemas.openxmlformats.org/officeDocument/2006/relationships" xmlns:p="http://schemas.openxmlformats.org/presentationml/2006/main" saveSubsetFonts="1">
   <p:sldMasterIdLst>
-    <p:sldMasterId id="2147483660" r:id="rId1"/>
+    <p:sldMasterId id="2147483672" r:id="rId1"/>
   </p:sldMasterIdLst>
   <p:notesMasterIdLst>
-    <p:notesMasterId r:id="rId14"/>
+    <p:notesMasterId r:id="rId17"/>
   </p:notesMasterIdLst>
   <p:sldIdLst>
     <p:sldId id="256" r:id="rId2"/>
@@ -17,9 +17,12 @@
     <p:sldId id="267" r:id="rId8"/>
     <p:sldId id="266" r:id="rId9"/>
     <p:sldId id="261" r:id="rId10"/>
-    <p:sldId id="262" r:id="rId11"/>
-    <p:sldId id="263" r:id="rId12"/>
-    <p:sldId id="264" r:id="rId13"/>
+    <p:sldId id="268" r:id="rId11"/>
+    <p:sldId id="269" r:id="rId12"/>
+    <p:sldId id="270" r:id="rId13"/>
+    <p:sldId id="262" r:id="rId14"/>
+    <p:sldId id="263" r:id="rId15"/>
+    <p:sldId id="264" r:id="rId16"/>
   </p:sldIdLst>
   <p:sldSz cx="12192000" cy="6858000"/>
   <p:notesSz cx="6858000" cy="9144000"/>
@@ -506,7 +509,7 @@
 
 <file path=ppt/slideLayouts/slideLayout1.xml><?xml version="1.0" encoding="utf-8"?>
 <p:sldLayout xmlns:a="http://schemas.openxmlformats.org/drawingml/2006/main" xmlns:r="http://schemas.openxmlformats.org/officeDocument/2006/relationships" xmlns:p="http://schemas.openxmlformats.org/presentationml/2006/main" showMasterSp="0" type="title" preserve="1">
-  <p:cSld name="Title Slide">
+  <p:cSld name="Titeldia">
     <p:spTree>
       <p:nvGrpSpPr>
         <p:cNvPr id="1" name=""/>
@@ -529,8 +532,8 @@
         </p:nvSpPr>
         <p:spPr>
           <a:xfrm>
-            <a:off x="3175" y="6400800"/>
-            <a:ext cx="12188825" cy="457200"/>
+            <a:off x="1" y="6400800"/>
+            <a:ext cx="12192000" cy="457200"/>
           </a:xfrm>
           <a:prstGeom prst="rect">
             <a:avLst/>
@@ -567,8 +570,8 @@
         </p:nvSpPr>
         <p:spPr>
           <a:xfrm>
-            <a:off x="15" y="6334316"/>
-            <a:ext cx="12188825" cy="64008"/>
+            <a:off x="1" y="6334316"/>
+            <a:ext cx="12192000" cy="66484"/>
           </a:xfrm>
           <a:prstGeom prst="rect">
             <a:avLst/>
@@ -634,8 +637,8 @@
           </a:lstStyle>
           <a:p>
             <a:r>
-              <a:rPr lang="en-US"/>
-              <a:t>Click to edit Master title style</a:t>
+              <a:rPr lang="nl-NL" smtClean="0"/>
+              <a:t>Klik om de stijl te bewerken</a:t>
             </a:r>
             <a:endParaRPr lang="en-US" dirty="0"/>
           </a:p>
@@ -653,7 +656,7 @@
         </p:nvSpPr>
         <p:spPr>
           <a:xfrm>
-            <a:off x="1100051" y="4455620"/>
+            <a:off x="1100051" y="4455621"/>
             <a:ext cx="10058400" cy="1143000"/>
           </a:xfrm>
         </p:spPr>
@@ -706,8 +709,8 @@
           </a:lstStyle>
           <a:p>
             <a:r>
-              <a:rPr lang="en-US"/>
-              <a:t>Click to edit Master subtitle style</a:t>
+              <a:rPr lang="nl-NL" smtClean="0"/>
+              <a:t>Klik om de ondertitelstijl van het model te bewerken</a:t>
             </a:r>
             <a:endParaRPr lang="en-US" dirty="0"/>
           </a:p>
@@ -819,7 +822,7 @@
     </p:spTree>
     <p:extLst>
       <p:ext uri="{BB962C8B-B14F-4D97-AF65-F5344CB8AC3E}">
-        <p14:creationId xmlns:p14="http://schemas.microsoft.com/office/powerpoint/2010/main" val="396996437"/>
+        <p14:creationId xmlns:p14="http://schemas.microsoft.com/office/powerpoint/2010/main" val="511738518"/>
       </p:ext>
     </p:extLst>
   </p:cSld>
@@ -831,7 +834,7 @@
 
 <file path=ppt/slideLayouts/slideLayout10.xml><?xml version="1.0" encoding="utf-8"?>
 <p:sldLayout xmlns:a="http://schemas.openxmlformats.org/drawingml/2006/main" xmlns:r="http://schemas.openxmlformats.org/officeDocument/2006/relationships" xmlns:p="http://schemas.openxmlformats.org/presentationml/2006/main" type="vertTx" preserve="1">
-  <p:cSld name="Title and Vertical Text">
+  <p:cSld name="Titel en verticale tekst">
     <p:spTree>
       <p:nvGrpSpPr>
         <p:cNvPr id="1" name=""/>
@@ -862,8 +865,8 @@
           <a:lstStyle/>
           <a:p>
             <a:r>
-              <a:rPr lang="en-US"/>
-              <a:t>Click to edit Master title style</a:t>
+              <a:rPr lang="nl-NL" smtClean="0"/>
+              <a:t>Klik om de stijl te bewerken</a:t>
             </a:r>
             <a:endParaRPr lang="en-US" dirty="0"/>
           </a:p>
@@ -886,36 +889,36 @@
           <a:p>
             <a:pPr lvl="0"/>
             <a:r>
-              <a:rPr lang="en-US"/>
-              <a:t>Edit Master text styles</a:t>
+              <a:rPr lang="nl-NL" smtClean="0"/>
+              <a:t>Klik om de modelstijlen te bewerken</a:t>
             </a:r>
           </a:p>
           <a:p>
             <a:pPr lvl="1"/>
             <a:r>
-              <a:rPr lang="en-US"/>
-              <a:t>Second level</a:t>
+              <a:rPr lang="nl-NL" smtClean="0"/>
+              <a:t>Tweede niveau</a:t>
             </a:r>
           </a:p>
           <a:p>
             <a:pPr lvl="2"/>
             <a:r>
-              <a:rPr lang="en-US"/>
-              <a:t>Third level</a:t>
+              <a:rPr lang="nl-NL" smtClean="0"/>
+              <a:t>Derde niveau</a:t>
             </a:r>
           </a:p>
           <a:p>
             <a:pPr lvl="3"/>
             <a:r>
-              <a:rPr lang="en-US"/>
-              <a:t>Fourth level</a:t>
+              <a:rPr lang="nl-NL" smtClean="0"/>
+              <a:t>Vierde niveau</a:t>
             </a:r>
           </a:p>
           <a:p>
             <a:pPr lvl="4"/>
             <a:r>
-              <a:rPr lang="en-US"/>
-              <a:t>Fifth level</a:t>
+              <a:rPr lang="nl-NL" smtClean="0"/>
+              <a:t>Vijfde niveau</a:t>
             </a:r>
             <a:endParaRPr lang="en-US" dirty="0"/>
           </a:p>
@@ -989,7 +992,7 @@
     </p:spTree>
     <p:extLst>
       <p:ext uri="{BB962C8B-B14F-4D97-AF65-F5344CB8AC3E}">
-        <p14:creationId xmlns:p14="http://schemas.microsoft.com/office/powerpoint/2010/main" val="1617382240"/>
+        <p14:creationId xmlns:p14="http://schemas.microsoft.com/office/powerpoint/2010/main" val="3100302139"/>
       </p:ext>
     </p:extLst>
   </p:cSld>
@@ -1001,7 +1004,7 @@
 
 <file path=ppt/slideLayouts/slideLayout11.xml><?xml version="1.0" encoding="utf-8"?>
 <p:sldLayout xmlns:a="http://schemas.openxmlformats.org/drawingml/2006/main" xmlns:r="http://schemas.openxmlformats.org/officeDocument/2006/relationships" xmlns:p="http://schemas.openxmlformats.org/presentationml/2006/main" showMasterSp="0" type="vertTitleAndTx" preserve="1">
-  <p:cSld name="Vertical Title and Text">
+  <p:cSld name="Verticale titel en tekst">
     <p:spTree>
       <p:nvGrpSpPr>
         <p:cNvPr id="1" name=""/>
@@ -1104,8 +1107,8 @@
         </p:nvSpPr>
         <p:spPr>
           <a:xfrm>
-            <a:off x="8724900" y="414778"/>
-            <a:ext cx="2628900" cy="5757421"/>
+            <a:off x="8724900" y="412302"/>
+            <a:ext cx="2628900" cy="5759898"/>
           </a:xfrm>
         </p:spPr>
         <p:txBody>
@@ -1113,8 +1116,8 @@
           <a:lstStyle/>
           <a:p>
             <a:r>
-              <a:rPr lang="en-US"/>
-              <a:t>Click to edit Master title style</a:t>
+              <a:rPr lang="nl-NL" smtClean="0"/>
+              <a:t>Klik om de stijl te bewerken</a:t>
             </a:r>
             <a:endParaRPr lang="en-US" dirty="0"/>
           </a:p>
@@ -1132,8 +1135,8 @@
         </p:nvSpPr>
         <p:spPr>
           <a:xfrm>
-            <a:off x="838200" y="414778"/>
-            <a:ext cx="7734300" cy="5757422"/>
+            <a:off x="838200" y="412302"/>
+            <a:ext cx="7734300" cy="5759898"/>
           </a:xfrm>
         </p:spPr>
         <p:txBody>
@@ -1142,36 +1145,36 @@
           <a:p>
             <a:pPr lvl="0"/>
             <a:r>
-              <a:rPr lang="en-US"/>
-              <a:t>Edit Master text styles</a:t>
+              <a:rPr lang="nl-NL" smtClean="0"/>
+              <a:t>Klik om de modelstijlen te bewerken</a:t>
             </a:r>
           </a:p>
           <a:p>
             <a:pPr lvl="1"/>
             <a:r>
-              <a:rPr lang="en-US"/>
-              <a:t>Second level</a:t>
+              <a:rPr lang="nl-NL" smtClean="0"/>
+              <a:t>Tweede niveau</a:t>
             </a:r>
           </a:p>
           <a:p>
             <a:pPr lvl="2"/>
             <a:r>
-              <a:rPr lang="en-US"/>
-              <a:t>Third level</a:t>
+              <a:rPr lang="nl-NL" smtClean="0"/>
+              <a:t>Derde niveau</a:t>
             </a:r>
           </a:p>
           <a:p>
             <a:pPr lvl="3"/>
             <a:r>
-              <a:rPr lang="en-US"/>
-              <a:t>Fourth level</a:t>
+              <a:rPr lang="nl-NL" smtClean="0"/>
+              <a:t>Vierde niveau</a:t>
             </a:r>
           </a:p>
           <a:p>
             <a:pPr lvl="4"/>
             <a:r>
-              <a:rPr lang="en-US"/>
-              <a:t>Fifth level</a:t>
+              <a:rPr lang="nl-NL" smtClean="0"/>
+              <a:t>Vijfde niveau</a:t>
             </a:r>
             <a:endParaRPr lang="en-US" dirty="0"/>
           </a:p>
@@ -1245,7 +1248,7 @@
     </p:spTree>
     <p:extLst>
       <p:ext uri="{BB962C8B-B14F-4D97-AF65-F5344CB8AC3E}">
-        <p14:creationId xmlns:p14="http://schemas.microsoft.com/office/powerpoint/2010/main" val="2344447424"/>
+        <p14:creationId xmlns:p14="http://schemas.microsoft.com/office/powerpoint/2010/main" val="2703426429"/>
       </p:ext>
     </p:extLst>
   </p:cSld>
@@ -1257,7 +1260,7 @@
 
 <file path=ppt/slideLayouts/slideLayout2.xml><?xml version="1.0" encoding="utf-8"?>
 <p:sldLayout xmlns:a="http://schemas.openxmlformats.org/drawingml/2006/main" xmlns:r="http://schemas.openxmlformats.org/officeDocument/2006/relationships" xmlns:p="http://schemas.openxmlformats.org/presentationml/2006/main" type="obj" preserve="1">
-  <p:cSld name="Title and Content">
+  <p:cSld name="Titel en object">
     <p:spTree>
       <p:nvGrpSpPr>
         <p:cNvPr id="1" name=""/>
@@ -1285,15 +1288,11 @@
         <p:spPr/>
         <p:txBody>
           <a:bodyPr/>
-          <a:lstStyle>
-            <a:lvl1pPr marL="0">
-              <a:defRPr/>
-            </a:lvl1pPr>
-          </a:lstStyle>
-          <a:p>
-            <a:r>
-              <a:rPr lang="en-US"/>
-              <a:t>Click to edit Master title style</a:t>
+          <a:lstStyle/>
+          <a:p>
+            <a:r>
+              <a:rPr lang="nl-NL" smtClean="0"/>
+              <a:t>Klik om de stijl te bewerken</a:t>
             </a:r>
             <a:endParaRPr lang="en-US" dirty="0"/>
           </a:p>
@@ -1316,36 +1315,36 @@
           <a:p>
             <a:pPr lvl="0"/>
             <a:r>
-              <a:rPr lang="en-US"/>
-              <a:t>Edit Master text styles</a:t>
+              <a:rPr lang="nl-NL" smtClean="0"/>
+              <a:t>Klik om de modelstijlen te bewerken</a:t>
             </a:r>
           </a:p>
           <a:p>
             <a:pPr lvl="1"/>
             <a:r>
-              <a:rPr lang="en-US"/>
-              <a:t>Second level</a:t>
+              <a:rPr lang="nl-NL" smtClean="0"/>
+              <a:t>Tweede niveau</a:t>
             </a:r>
           </a:p>
           <a:p>
             <a:pPr lvl="2"/>
             <a:r>
-              <a:rPr lang="en-US"/>
-              <a:t>Third level</a:t>
+              <a:rPr lang="nl-NL" smtClean="0"/>
+              <a:t>Derde niveau</a:t>
             </a:r>
           </a:p>
           <a:p>
             <a:pPr lvl="3"/>
             <a:r>
-              <a:rPr lang="en-US"/>
-              <a:t>Fourth level</a:t>
+              <a:rPr lang="nl-NL" smtClean="0"/>
+              <a:t>Vierde niveau</a:t>
             </a:r>
           </a:p>
           <a:p>
             <a:pPr lvl="4"/>
             <a:r>
-              <a:rPr lang="en-US"/>
-              <a:t>Fifth level</a:t>
+              <a:rPr lang="nl-NL" smtClean="0"/>
+              <a:t>Vijfde niveau</a:t>
             </a:r>
             <a:endParaRPr lang="en-US" dirty="0"/>
           </a:p>
@@ -1419,7 +1418,7 @@
     </p:spTree>
     <p:extLst>
       <p:ext uri="{BB962C8B-B14F-4D97-AF65-F5344CB8AC3E}">
-        <p14:creationId xmlns:p14="http://schemas.microsoft.com/office/powerpoint/2010/main" val="4209092473"/>
+        <p14:creationId xmlns:p14="http://schemas.microsoft.com/office/powerpoint/2010/main" val="1146542528"/>
       </p:ext>
     </p:extLst>
   </p:cSld>
@@ -1431,7 +1430,7 @@
 
 <file path=ppt/slideLayouts/slideLayout3.xml><?xml version="1.0" encoding="utf-8"?>
 <p:sldLayout xmlns:a="http://schemas.openxmlformats.org/drawingml/2006/main" xmlns:r="http://schemas.openxmlformats.org/officeDocument/2006/relationships" xmlns:p="http://schemas.openxmlformats.org/presentationml/2006/main" showMasterSp="0" type="secHead" preserve="1">
-  <p:cSld name="Section Header">
+  <p:cSld name="Sectiekop">
     <p:bg>
       <p:bgPr>
         <a:solidFill>
@@ -1567,8 +1566,8 @@
           </a:lstStyle>
           <a:p>
             <a:r>
-              <a:rPr lang="en-US"/>
-              <a:t>Click to edit Master title style</a:t>
+              <a:rPr lang="nl-NL" smtClean="0"/>
+              <a:t>Klik om de stijl te bewerken</a:t>
             </a:r>
             <a:endParaRPr lang="en-US" dirty="0"/>
           </a:p>
@@ -1688,8 +1687,8 @@
           <a:p>
             <a:pPr lvl="0"/>
             <a:r>
-              <a:rPr lang="en-US"/>
-              <a:t>Edit Master text styles</a:t>
+              <a:rPr lang="nl-NL" smtClean="0"/>
+              <a:t>Klik om de modelstijlen te bewerken</a:t>
             </a:r>
           </a:p>
         </p:txBody>
@@ -1800,7 +1799,7 @@
     </p:spTree>
     <p:extLst>
       <p:ext uri="{BB962C8B-B14F-4D97-AF65-F5344CB8AC3E}">
-        <p14:creationId xmlns:p14="http://schemas.microsoft.com/office/powerpoint/2010/main" val="3194675065"/>
+        <p14:creationId xmlns:p14="http://schemas.microsoft.com/office/powerpoint/2010/main" val="1737096757"/>
       </p:ext>
     </p:extLst>
   </p:cSld>
@@ -1812,7 +1811,7 @@
 
 <file path=ppt/slideLayouts/slideLayout4.xml><?xml version="1.0" encoding="utf-8"?>
 <p:sldLayout xmlns:a="http://schemas.openxmlformats.org/drawingml/2006/main" xmlns:r="http://schemas.openxmlformats.org/officeDocument/2006/relationships" xmlns:p="http://schemas.openxmlformats.org/presentationml/2006/main" type="twoObj" preserve="1">
-  <p:cSld name="Two Content">
+  <p:cSld name="Inhoud van twee">
     <p:spTree>
       <p:nvGrpSpPr>
         <p:cNvPr id="1" name=""/>
@@ -1848,8 +1847,8 @@
           <a:lstStyle/>
           <a:p>
             <a:r>
-              <a:rPr lang="en-US"/>
-              <a:t>Click to edit Master title style</a:t>
+              <a:rPr lang="nl-NL" smtClean="0"/>
+              <a:t>Klik om de stijl te bewerken</a:t>
             </a:r>
             <a:endParaRPr lang="en-US" dirty="0"/>
           </a:p>
@@ -1867,8 +1866,8 @@
         </p:nvSpPr>
         <p:spPr>
           <a:xfrm>
-            <a:off x="1097279" y="1845734"/>
-            <a:ext cx="4937760" cy="4023360"/>
+            <a:off x="1097280" y="1845734"/>
+            <a:ext cx="4937760" cy="4023359"/>
           </a:xfrm>
         </p:spPr>
         <p:txBody>
@@ -1877,36 +1876,36 @@
           <a:p>
             <a:pPr lvl="0"/>
             <a:r>
-              <a:rPr lang="en-US"/>
-              <a:t>Edit Master text styles</a:t>
+              <a:rPr lang="nl-NL" smtClean="0"/>
+              <a:t>Klik om de modelstijlen te bewerken</a:t>
             </a:r>
           </a:p>
           <a:p>
             <a:pPr lvl="1"/>
             <a:r>
-              <a:rPr lang="en-US"/>
-              <a:t>Second level</a:t>
+              <a:rPr lang="nl-NL" smtClean="0"/>
+              <a:t>Tweede niveau</a:t>
             </a:r>
           </a:p>
           <a:p>
             <a:pPr lvl="2"/>
             <a:r>
-              <a:rPr lang="en-US"/>
-              <a:t>Third level</a:t>
+              <a:rPr lang="nl-NL" smtClean="0"/>
+              <a:t>Derde niveau</a:t>
             </a:r>
           </a:p>
           <a:p>
             <a:pPr lvl="3"/>
             <a:r>
-              <a:rPr lang="en-US"/>
-              <a:t>Fourth level</a:t>
+              <a:rPr lang="nl-NL" smtClean="0"/>
+              <a:t>Vierde niveau</a:t>
             </a:r>
           </a:p>
           <a:p>
             <a:pPr lvl="4"/>
             <a:r>
-              <a:rPr lang="en-US"/>
-              <a:t>Fifth level</a:t>
+              <a:rPr lang="nl-NL" smtClean="0"/>
+              <a:t>Vijfde niveau</a:t>
             </a:r>
             <a:endParaRPr lang="en-US" dirty="0"/>
           </a:p>
@@ -1934,36 +1933,36 @@
           <a:p>
             <a:pPr lvl="0"/>
             <a:r>
-              <a:rPr lang="en-US"/>
-              <a:t>Edit Master text styles</a:t>
+              <a:rPr lang="nl-NL" smtClean="0"/>
+              <a:t>Klik om de modelstijlen te bewerken</a:t>
             </a:r>
           </a:p>
           <a:p>
             <a:pPr lvl="1"/>
             <a:r>
-              <a:rPr lang="en-US"/>
-              <a:t>Second level</a:t>
+              <a:rPr lang="nl-NL" smtClean="0"/>
+              <a:t>Tweede niveau</a:t>
             </a:r>
           </a:p>
           <a:p>
             <a:pPr lvl="2"/>
             <a:r>
-              <a:rPr lang="en-US"/>
-              <a:t>Third level</a:t>
+              <a:rPr lang="nl-NL" smtClean="0"/>
+              <a:t>Derde niveau</a:t>
             </a:r>
           </a:p>
           <a:p>
             <a:pPr lvl="3"/>
             <a:r>
-              <a:rPr lang="en-US"/>
-              <a:t>Fourth level</a:t>
+              <a:rPr lang="nl-NL" smtClean="0"/>
+              <a:t>Vierde niveau</a:t>
             </a:r>
           </a:p>
           <a:p>
             <a:pPr lvl="4"/>
             <a:r>
-              <a:rPr lang="en-US"/>
-              <a:t>Fifth level</a:t>
+              <a:rPr lang="nl-NL" smtClean="0"/>
+              <a:t>Vijfde niveau</a:t>
             </a:r>
             <a:endParaRPr lang="en-US" dirty="0"/>
           </a:p>
@@ -2037,7 +2036,7 @@
     </p:spTree>
     <p:extLst>
       <p:ext uri="{BB962C8B-B14F-4D97-AF65-F5344CB8AC3E}">
-        <p14:creationId xmlns:p14="http://schemas.microsoft.com/office/powerpoint/2010/main" val="2907088544"/>
+        <p14:creationId xmlns:p14="http://schemas.microsoft.com/office/powerpoint/2010/main" val="3270046438"/>
       </p:ext>
     </p:extLst>
   </p:cSld>
@@ -2049,7 +2048,7 @@
 
 <file path=ppt/slideLayouts/slideLayout5.xml><?xml version="1.0" encoding="utf-8"?>
 <p:sldLayout xmlns:a="http://schemas.openxmlformats.org/drawingml/2006/main" xmlns:r="http://schemas.openxmlformats.org/officeDocument/2006/relationships" xmlns:p="http://schemas.openxmlformats.org/presentationml/2006/main" type="twoTxTwoObj" preserve="1">
-  <p:cSld name="Comparison">
+  <p:cSld name="Vergelijking">
     <p:spTree>
       <p:nvGrpSpPr>
         <p:cNvPr id="1" name=""/>
@@ -2085,8 +2084,8 @@
           <a:lstStyle/>
           <a:p>
             <a:r>
-              <a:rPr lang="en-US"/>
-              <a:t>Click to edit Master title style</a:t>
+              <a:rPr lang="nl-NL" smtClean="0"/>
+              <a:t>Klik om de stijl te bewerken</a:t>
             </a:r>
             <a:endParaRPr lang="en-US" dirty="0"/>
           </a:p>
@@ -2157,8 +2156,8 @@
           <a:p>
             <a:pPr lvl="0"/>
             <a:r>
-              <a:rPr lang="en-US"/>
-              <a:t>Edit Master text styles</a:t>
+              <a:rPr lang="nl-NL" smtClean="0"/>
+              <a:t>Klik om de modelstijlen te bewerken</a:t>
             </a:r>
           </a:p>
         </p:txBody>
@@ -2175,8 +2174,8 @@
         </p:nvSpPr>
         <p:spPr>
           <a:xfrm>
-            <a:off x="1097280" y="2582334"/>
-            <a:ext cx="4937760" cy="3378200"/>
+            <a:off x="1097280" y="2582335"/>
+            <a:ext cx="4937760" cy="3286760"/>
           </a:xfrm>
         </p:spPr>
         <p:txBody>
@@ -2185,36 +2184,36 @@
           <a:p>
             <a:pPr lvl="0"/>
             <a:r>
-              <a:rPr lang="en-US"/>
-              <a:t>Edit Master text styles</a:t>
+              <a:rPr lang="nl-NL" smtClean="0"/>
+              <a:t>Klik om de modelstijlen te bewerken</a:t>
             </a:r>
           </a:p>
           <a:p>
             <a:pPr lvl="1"/>
             <a:r>
-              <a:rPr lang="en-US"/>
-              <a:t>Second level</a:t>
+              <a:rPr lang="nl-NL" smtClean="0"/>
+              <a:t>Tweede niveau</a:t>
             </a:r>
           </a:p>
           <a:p>
             <a:pPr lvl="2"/>
             <a:r>
-              <a:rPr lang="en-US"/>
-              <a:t>Third level</a:t>
+              <a:rPr lang="nl-NL" smtClean="0"/>
+              <a:t>Derde niveau</a:t>
             </a:r>
           </a:p>
           <a:p>
             <a:pPr lvl="3"/>
             <a:r>
-              <a:rPr lang="en-US"/>
-              <a:t>Fourth level</a:t>
+              <a:rPr lang="nl-NL" smtClean="0"/>
+              <a:t>Vierde niveau</a:t>
             </a:r>
           </a:p>
           <a:p>
             <a:pPr lvl="4"/>
             <a:r>
-              <a:rPr lang="en-US"/>
-              <a:t>Fifth level</a:t>
+              <a:rPr lang="nl-NL" smtClean="0"/>
+              <a:t>Vijfde niveau</a:t>
             </a:r>
             <a:endParaRPr lang="en-US" dirty="0"/>
           </a:p>
@@ -2285,8 +2284,8 @@
           <a:p>
             <a:pPr lvl="0"/>
             <a:r>
-              <a:rPr lang="en-US"/>
-              <a:t>Edit Master text styles</a:t>
+              <a:rPr lang="nl-NL" smtClean="0"/>
+              <a:t>Klik om de modelstijlen te bewerken</a:t>
             </a:r>
           </a:p>
         </p:txBody>
@@ -2304,7 +2303,7 @@
         <p:spPr>
           <a:xfrm>
             <a:off x="6217920" y="2582334"/>
-            <a:ext cx="4937760" cy="3378200"/>
+            <a:ext cx="4937760" cy="3286760"/>
           </a:xfrm>
         </p:spPr>
         <p:txBody>
@@ -2313,36 +2312,36 @@
           <a:p>
             <a:pPr lvl="0"/>
             <a:r>
-              <a:rPr lang="en-US"/>
-              <a:t>Edit Master text styles</a:t>
+              <a:rPr lang="nl-NL" smtClean="0"/>
+              <a:t>Klik om de modelstijlen te bewerken</a:t>
             </a:r>
           </a:p>
           <a:p>
             <a:pPr lvl="1"/>
             <a:r>
-              <a:rPr lang="en-US"/>
-              <a:t>Second level</a:t>
+              <a:rPr lang="nl-NL" smtClean="0"/>
+              <a:t>Tweede niveau</a:t>
             </a:r>
           </a:p>
           <a:p>
             <a:pPr lvl="2"/>
             <a:r>
-              <a:rPr lang="en-US"/>
-              <a:t>Third level</a:t>
+              <a:rPr lang="nl-NL" smtClean="0"/>
+              <a:t>Derde niveau</a:t>
             </a:r>
           </a:p>
           <a:p>
             <a:pPr lvl="3"/>
             <a:r>
-              <a:rPr lang="en-US"/>
-              <a:t>Fourth level</a:t>
+              <a:rPr lang="nl-NL" smtClean="0"/>
+              <a:t>Vierde niveau</a:t>
             </a:r>
           </a:p>
           <a:p>
             <a:pPr lvl="4"/>
             <a:r>
-              <a:rPr lang="en-US"/>
-              <a:t>Fifth level</a:t>
+              <a:rPr lang="nl-NL" smtClean="0"/>
+              <a:t>Vijfde niveau</a:t>
             </a:r>
             <a:endParaRPr lang="en-US" dirty="0"/>
           </a:p>
@@ -2416,7 +2415,7 @@
     </p:spTree>
     <p:extLst>
       <p:ext uri="{BB962C8B-B14F-4D97-AF65-F5344CB8AC3E}">
-        <p14:creationId xmlns:p14="http://schemas.microsoft.com/office/powerpoint/2010/main" val="2165346991"/>
+        <p14:creationId xmlns:p14="http://schemas.microsoft.com/office/powerpoint/2010/main" val="3814223523"/>
       </p:ext>
     </p:extLst>
   </p:cSld>
@@ -2428,7 +2427,7 @@
 
 <file path=ppt/slideLayouts/slideLayout6.xml><?xml version="1.0" encoding="utf-8"?>
 <p:sldLayout xmlns:a="http://schemas.openxmlformats.org/drawingml/2006/main" xmlns:r="http://schemas.openxmlformats.org/officeDocument/2006/relationships" xmlns:p="http://schemas.openxmlformats.org/presentationml/2006/main" type="titleOnly" preserve="1">
-  <p:cSld name="Title Only">
+  <p:cSld name="Alleen titel">
     <p:spTree>
       <p:nvGrpSpPr>
         <p:cNvPr id="1" name=""/>
@@ -2459,8 +2458,8 @@
           <a:lstStyle/>
           <a:p>
             <a:r>
-              <a:rPr lang="en-US"/>
-              <a:t>Click to edit Master title style</a:t>
+              <a:rPr lang="nl-NL" smtClean="0"/>
+              <a:t>Klik om de stijl te bewerken</a:t>
             </a:r>
             <a:endParaRPr lang="en-US" dirty="0"/>
           </a:p>
@@ -2534,7 +2533,7 @@
     </p:spTree>
     <p:extLst>
       <p:ext uri="{BB962C8B-B14F-4D97-AF65-F5344CB8AC3E}">
-        <p14:creationId xmlns:p14="http://schemas.microsoft.com/office/powerpoint/2010/main" val="567337947"/>
+        <p14:creationId xmlns:p14="http://schemas.microsoft.com/office/powerpoint/2010/main" val="1892534325"/>
       </p:ext>
     </p:extLst>
   </p:cSld>
@@ -2546,7 +2545,7 @@
 
 <file path=ppt/slideLayouts/slideLayout7.xml><?xml version="1.0" encoding="utf-8"?>
 <p:sldLayout xmlns:a="http://schemas.openxmlformats.org/drawingml/2006/main" xmlns:r="http://schemas.openxmlformats.org/officeDocument/2006/relationships" xmlns:p="http://schemas.openxmlformats.org/presentationml/2006/main" showMasterSp="0" type="blank" preserve="1">
-  <p:cSld name="Blank">
+  <p:cSld name="Leeg">
     <p:spTree>
       <p:nvGrpSpPr>
         <p:cNvPr id="1" name=""/>
@@ -2713,7 +2712,7 @@
     </p:spTree>
     <p:extLst>
       <p:ext uri="{BB962C8B-B14F-4D97-AF65-F5344CB8AC3E}">
-        <p14:creationId xmlns:p14="http://schemas.microsoft.com/office/powerpoint/2010/main" val="554379450"/>
+        <p14:creationId xmlns:p14="http://schemas.microsoft.com/office/powerpoint/2010/main" val="3190143588"/>
       </p:ext>
     </p:extLst>
   </p:cSld>
@@ -2725,7 +2724,7 @@
 
 <file path=ppt/slideLayouts/slideLayout8.xml><?xml version="1.0" encoding="utf-8"?>
 <p:sldLayout xmlns:a="http://schemas.openxmlformats.org/drawingml/2006/main" xmlns:r="http://schemas.openxmlformats.org/officeDocument/2006/relationships" xmlns:p="http://schemas.openxmlformats.org/presentationml/2006/main" showMasterSp="0" type="objTx" preserve="1">
-  <p:cSld name="Content with Caption">
+  <p:cSld name="Inhoud met bijschrift">
     <p:spTree>
       <p:nvGrpSpPr>
         <p:cNvPr id="1" name=""/>
@@ -2847,8 +2846,8 @@
           </a:lstStyle>
           <a:p>
             <a:r>
-              <a:rPr lang="en-US"/>
-              <a:t>Click to edit Master title style</a:t>
+              <a:rPr lang="nl-NL" smtClean="0"/>
+              <a:t>Klik om de stijl te bewerken</a:t>
             </a:r>
             <a:endParaRPr lang="en-US" dirty="0"/>
           </a:p>
@@ -2876,36 +2875,36 @@
           <a:p>
             <a:pPr lvl="0"/>
             <a:r>
-              <a:rPr lang="en-US"/>
-              <a:t>Edit Master text styles</a:t>
+              <a:rPr lang="nl-NL" smtClean="0"/>
+              <a:t>Klik om de modelstijlen te bewerken</a:t>
             </a:r>
           </a:p>
           <a:p>
             <a:pPr lvl="1"/>
             <a:r>
-              <a:rPr lang="en-US"/>
-              <a:t>Second level</a:t>
+              <a:rPr lang="nl-NL" smtClean="0"/>
+              <a:t>Tweede niveau</a:t>
             </a:r>
           </a:p>
           <a:p>
             <a:pPr lvl="2"/>
             <a:r>
-              <a:rPr lang="en-US"/>
-              <a:t>Third level</a:t>
+              <a:rPr lang="nl-NL" smtClean="0"/>
+              <a:t>Derde niveau</a:t>
             </a:r>
           </a:p>
           <a:p>
             <a:pPr lvl="3"/>
             <a:r>
-              <a:rPr lang="en-US"/>
-              <a:t>Fourth level</a:t>
+              <a:rPr lang="nl-NL" smtClean="0"/>
+              <a:t>Vierde niveau</a:t>
             </a:r>
           </a:p>
           <a:p>
             <a:pPr lvl="4"/>
             <a:r>
-              <a:rPr lang="en-US"/>
-              <a:t>Fifth level</a:t>
+              <a:rPr lang="nl-NL" smtClean="0"/>
+              <a:t>Vijfde niveau</a:t>
             </a:r>
             <a:endParaRPr lang="en-US" dirty="0"/>
           </a:p>
@@ -2976,8 +2975,8 @@
           <a:p>
             <a:pPr lvl="0"/>
             <a:r>
-              <a:rPr lang="en-US"/>
-              <a:t>Edit Master text styles</a:t>
+              <a:rPr lang="nl-NL" smtClean="0"/>
+              <a:t>Klik om de modelstijlen te bewerken</a:t>
             </a:r>
           </a:p>
         </p:txBody>
@@ -3080,7 +3079,7 @@
     </p:spTree>
     <p:extLst>
       <p:ext uri="{BB962C8B-B14F-4D97-AF65-F5344CB8AC3E}">
-        <p14:creationId xmlns:p14="http://schemas.microsoft.com/office/powerpoint/2010/main" val="985108082"/>
+        <p14:creationId xmlns:p14="http://schemas.microsoft.com/office/powerpoint/2010/main" val="2733619931"/>
       </p:ext>
     </p:extLst>
   </p:cSld>
@@ -3092,7 +3091,7 @@
 
 <file path=ppt/slideLayouts/slideLayout9.xml><?xml version="1.0" encoding="utf-8"?>
 <p:sldLayout xmlns:a="http://schemas.openxmlformats.org/drawingml/2006/main" xmlns:r="http://schemas.openxmlformats.org/officeDocument/2006/relationships" xmlns:p="http://schemas.openxmlformats.org/presentationml/2006/main" showMasterSp="0" type="picTx" preserve="1">
-  <p:cSld name="Picture with Caption">
+  <p:cSld name="Afbeelding met bijschrift">
     <p:spTree>
       <p:nvGrpSpPr>
         <p:cNvPr id="1" name=""/>
@@ -3196,11 +3195,11 @@
         <p:spPr>
           <a:xfrm>
             <a:off x="1097280" y="5074920"/>
-            <a:ext cx="10113264" cy="822960"/>
+            <a:ext cx="10113645" cy="822960"/>
           </a:xfrm>
         </p:spPr>
         <p:txBody>
-          <a:bodyPr lIns="91440" tIns="0" rIns="91440" bIns="0" anchor="b">
+          <a:bodyPr tIns="0" bIns="0" anchor="b">
             <a:noAutofit/>
           </a:bodyPr>
           <a:lstStyle>
@@ -3214,8 +3213,8 @@
           </a:lstStyle>
           <a:p>
             <a:r>
-              <a:rPr lang="en-US"/>
-              <a:t>Click to edit Master title style</a:t>
+              <a:rPr lang="nl-NL" smtClean="0"/>
+              <a:t>Klik om de stijl te bewerken</a:t>
             </a:r>
             <a:endParaRPr lang="en-US" dirty="0"/>
           </a:p>
@@ -3236,23 +3235,18 @@
             <a:off x="15" y="0"/>
             <a:ext cx="12191985" cy="4915076"/>
           </a:xfrm>
-          <a:blipFill>
-            <a:blip r:embed="rId2"/>
-            <a:stretch>
-              <a:fillRect/>
-            </a:stretch>
-          </a:blipFill>
+          <a:solidFill>
+            <a:schemeClr val="bg2">
+              <a:lumMod val="90000"/>
+            </a:schemeClr>
+          </a:solidFill>
         </p:spPr>
         <p:txBody>
           <a:bodyPr lIns="457200" tIns="457200" anchor="t"/>
           <a:lstStyle>
             <a:lvl1pPr marL="0" indent="0">
               <a:buNone/>
-              <a:defRPr sz="3200">
-                <a:solidFill>
-                  <a:schemeClr val="bg1"/>
-                </a:solidFill>
-              </a:defRPr>
+              <a:defRPr sz="3200"/>
             </a:lvl1pPr>
             <a:lvl2pPr marL="457200" indent="0">
               <a:buNone/>
@@ -3289,8 +3283,8 @@
           </a:lstStyle>
           <a:p>
             <a:r>
-              <a:rPr lang="en-US"/>
-              <a:t>Click icon to add picture</a:t>
+              <a:rPr lang="nl-NL" smtClean="0"/>
+              <a:t>Klik op het pictogram als u een afbeelding wilt toevoegen</a:t>
             </a:r>
             <a:endParaRPr lang="en-US" dirty="0"/>
           </a:p>
@@ -3308,7 +3302,7 @@
         </p:nvSpPr>
         <p:spPr>
           <a:xfrm>
-            <a:off x="1097280" y="5907023"/>
+            <a:off x="1097280" y="5907024"/>
             <a:ext cx="10113264" cy="594360"/>
           </a:xfrm>
         </p:spPr>
@@ -3367,8 +3361,8 @@
           <a:p>
             <a:pPr lvl="0"/>
             <a:r>
-              <a:rPr lang="en-US"/>
-              <a:t>Edit Master text styles</a:t>
+              <a:rPr lang="nl-NL" smtClean="0"/>
+              <a:t>Klik om de modelstijlen te bewerken</a:t>
             </a:r>
           </a:p>
         </p:txBody>
@@ -3441,7 +3435,7 @@
     </p:spTree>
     <p:extLst>
       <p:ext uri="{BB962C8B-B14F-4D97-AF65-F5344CB8AC3E}">
-        <p14:creationId xmlns:p14="http://schemas.microsoft.com/office/powerpoint/2010/main" val="138326031"/>
+        <p14:creationId xmlns:p14="http://schemas.microsoft.com/office/powerpoint/2010/main" val="1898886823"/>
       </p:ext>
     </p:extLst>
   </p:cSld>
@@ -3481,8 +3475,8 @@
         </p:nvSpPr>
         <p:spPr>
           <a:xfrm>
-            <a:off x="1" y="6400800"/>
-            <a:ext cx="12192000" cy="457200"/>
+            <a:off x="3175" y="6400800"/>
+            <a:ext cx="12188825" cy="457200"/>
           </a:xfrm>
           <a:prstGeom prst="rect">
             <a:avLst/>
@@ -3519,8 +3513,8 @@
         </p:nvSpPr>
         <p:spPr>
           <a:xfrm>
-            <a:off x="0" y="6334316"/>
-            <a:ext cx="12192001" cy="65998"/>
+            <a:off x="15" y="6334316"/>
+            <a:ext cx="12188825" cy="64008"/>
           </a:xfrm>
           <a:prstGeom prst="rect">
             <a:avLst/>
@@ -3575,8 +3569,8 @@
           <a:lstStyle/>
           <a:p>
             <a:r>
-              <a:rPr lang="en-US"/>
-              <a:t>Click to edit Master title style</a:t>
+              <a:rPr lang="nl-NL" smtClean="0"/>
+              <a:t>Klik om de stijl te bewerken</a:t>
             </a:r>
             <a:endParaRPr lang="en-US" dirty="0"/>
           </a:p>
@@ -3609,36 +3603,36 @@
           <a:p>
             <a:pPr lvl="0"/>
             <a:r>
-              <a:rPr lang="en-US"/>
-              <a:t>Edit Master text styles</a:t>
+              <a:rPr lang="nl-NL" smtClean="0"/>
+              <a:t>Klik om de modelstijlen te bewerken</a:t>
             </a:r>
           </a:p>
           <a:p>
             <a:pPr lvl="1"/>
             <a:r>
-              <a:rPr lang="en-US"/>
-              <a:t>Second level</a:t>
+              <a:rPr lang="nl-NL" smtClean="0"/>
+              <a:t>Tweede niveau</a:t>
             </a:r>
           </a:p>
           <a:p>
             <a:pPr lvl="2"/>
             <a:r>
-              <a:rPr lang="en-US"/>
-              <a:t>Third level</a:t>
+              <a:rPr lang="nl-NL" smtClean="0"/>
+              <a:t>Derde niveau</a:t>
             </a:r>
           </a:p>
           <a:p>
             <a:pPr lvl="3"/>
             <a:r>
-              <a:rPr lang="en-US"/>
-              <a:t>Fourth level</a:t>
+              <a:rPr lang="nl-NL" smtClean="0"/>
+              <a:t>Vierde niveau</a:t>
             </a:r>
           </a:p>
           <a:p>
             <a:pPr lvl="4"/>
             <a:r>
-              <a:rPr lang="en-US"/>
-              <a:t>Fifth level</a:t>
+              <a:rPr lang="nl-NL" smtClean="0"/>
+              <a:t>Vijfde niveau</a:t>
             </a:r>
             <a:endParaRPr lang="en-US" dirty="0"/>
           </a:p>
@@ -3798,23 +3792,23 @@
     </p:spTree>
     <p:extLst>
       <p:ext uri="{BB962C8B-B14F-4D97-AF65-F5344CB8AC3E}">
-        <p14:creationId xmlns:p14="http://schemas.microsoft.com/office/powerpoint/2010/main" val="550406845"/>
+        <p14:creationId xmlns:p14="http://schemas.microsoft.com/office/powerpoint/2010/main" val="941566731"/>
       </p:ext>
     </p:extLst>
   </p:cSld>
   <p:clrMap bg1="lt1" tx1="dk1" bg2="lt2" tx2="dk2" accent1="accent1" accent2="accent2" accent3="accent3" accent4="accent4" accent5="accent5" accent6="accent6" hlink="hlink" folHlink="folHlink"/>
   <p:sldLayoutIdLst>
-    <p:sldLayoutId id="2147483661" r:id="rId1"/>
-    <p:sldLayoutId id="2147483662" r:id="rId2"/>
-    <p:sldLayoutId id="2147483663" r:id="rId3"/>
-    <p:sldLayoutId id="2147483664" r:id="rId4"/>
-    <p:sldLayoutId id="2147483665" r:id="rId5"/>
-    <p:sldLayoutId id="2147483666" r:id="rId6"/>
-    <p:sldLayoutId id="2147483667" r:id="rId7"/>
-    <p:sldLayoutId id="2147483668" r:id="rId8"/>
-    <p:sldLayoutId id="2147483669" r:id="rId9"/>
-    <p:sldLayoutId id="2147483670" r:id="rId10"/>
-    <p:sldLayoutId id="2147483671" r:id="rId11"/>
+    <p:sldLayoutId id="2147483673" r:id="rId1"/>
+    <p:sldLayoutId id="2147483674" r:id="rId2"/>
+    <p:sldLayoutId id="2147483675" r:id="rId3"/>
+    <p:sldLayoutId id="2147483676" r:id="rId4"/>
+    <p:sldLayoutId id="2147483677" r:id="rId5"/>
+    <p:sldLayoutId id="2147483678" r:id="rId6"/>
+    <p:sldLayoutId id="2147483679" r:id="rId7"/>
+    <p:sldLayoutId id="2147483680" r:id="rId8"/>
+    <p:sldLayoutId id="2147483681" r:id="rId9"/>
+    <p:sldLayoutId id="2147483682" r:id="rId10"/>
+    <p:sldLayoutId id="2147483683" r:id="rId11"/>
   </p:sldLayoutIdLst>
   <p:txStyles>
     <p:titleStyle>
@@ -4259,6 +4253,13 @@
   <p:clrMapOvr>
     <a:masterClrMapping/>
   </p:clrMapOvr>
+  <p:timing>
+    <p:tnLst>
+      <p:par>
+        <p:cTn id="1" dur="indefinite" restart="never" nodeType="tmRoot"/>
+      </p:par>
+    </p:tnLst>
+  </p:timing>
 </p:sld>
 </file>
 
@@ -4284,7 +4285,7 @@
           <p:cNvPr id="2" name="Titel 1">
             <a:extLst>
               <a:ext uri="{FF2B5EF4-FFF2-40B4-BE49-F238E27FC236}">
-                <a16:creationId xmlns:a16="http://schemas.microsoft.com/office/drawing/2014/main" id="{AEC34B59-0146-C33F-CFC6-890060B52779}"/>
+                <a16:creationId xmlns:a16="http://schemas.microsoft.com/office/drawing/2014/main" xmlns="" id="{BE311A97-C066-5B05-482F-0E6FA4903BCF}"/>
               </a:ext>
             </a:extLst>
           </p:cNvPr>
@@ -4297,77 +4298,79 @@
         </p:nvSpPr>
         <p:spPr/>
         <p:txBody>
+          <a:bodyPr>
+            <a:normAutofit/>
+          </a:bodyPr>
+          <a:lstStyle/>
+          <a:p>
+            <a:r>
+              <a:rPr lang="nl-BE" sz="4800" dirty="0"/>
+              <a:t>Sprints</a:t>
+            </a:r>
+          </a:p>
+        </p:txBody>
+      </p:sp>
+      <p:pic>
+        <p:nvPicPr>
+          <p:cNvPr id="3" name="Tijdelijke aanduiding voor inhoud 2"/>
+          <p:cNvPicPr>
+            <a:picLocks noGrp="1" noChangeAspect="1"/>
+          </p:cNvPicPr>
+          <p:nvPr>
+            <p:ph idx="1"/>
+          </p:nvPr>
+        </p:nvPicPr>
+        <p:blipFill rotWithShape="1">
+          <a:blip r:embed="rId2"/>
+          <a:srcRect r="2994"/>
+          <a:stretch/>
+        </p:blipFill>
+        <p:spPr>
+          <a:xfrm>
+            <a:off x="4138452" y="594359"/>
+            <a:ext cx="7601604" cy="3940353"/>
+          </a:xfrm>
+          <a:prstGeom prst="rect">
+            <a:avLst/>
+          </a:prstGeom>
+        </p:spPr>
+      </p:pic>
+      <p:sp>
+        <p:nvSpPr>
+          <p:cNvPr id="5" name="Tijdelijke aanduiding voor tekst 4"/>
+          <p:cNvSpPr>
+            <a:spLocks noGrp="1"/>
+          </p:cNvSpPr>
+          <p:nvPr>
+            <p:ph type="body" sz="half" idx="2"/>
+          </p:nvPr>
+        </p:nvSpPr>
+        <p:spPr/>
+        <p:txBody>
           <a:bodyPr/>
           <a:lstStyle/>
           <a:p>
-            <a:r>
-              <a:rPr lang="nl-BE" dirty="0"/>
-              <a:t>Uitvoering</a:t>
-            </a:r>
-          </a:p>
-        </p:txBody>
-      </p:sp>
-      <p:sp>
-        <p:nvSpPr>
-          <p:cNvPr id="3" name="Tijdelijke aanduiding voor inhoud 2">
-            <a:extLst>
-              <a:ext uri="{FF2B5EF4-FFF2-40B4-BE49-F238E27FC236}">
-                <a16:creationId xmlns:a16="http://schemas.microsoft.com/office/drawing/2014/main" id="{4BE4A8C1-501E-56ED-71C8-F32C29245B80}"/>
-              </a:ext>
-            </a:extLst>
-          </p:cNvPr>
-          <p:cNvSpPr>
-            <a:spLocks noGrp="1"/>
-          </p:cNvSpPr>
-          <p:nvPr>
-            <p:ph idx="1"/>
-          </p:nvPr>
-        </p:nvSpPr>
-        <p:spPr/>
-        <p:txBody>
-          <a:bodyPr/>
-          <a:lstStyle/>
-          <a:p>
-            <a:r>
-              <a:rPr lang="nl-BE" dirty="0" err="1"/>
-              <a:t>Github</a:t>
-            </a:r>
             <a:endParaRPr lang="nl-BE" dirty="0"/>
-          </a:p>
-          <a:p>
-            <a:r>
-              <a:rPr lang="nl-BE" dirty="0"/>
-              <a:t>Visio</a:t>
-            </a:r>
-          </a:p>
-          <a:p>
-            <a:r>
-              <a:rPr lang="nl-BE" dirty="0"/>
-              <a:t>Python3</a:t>
-            </a:r>
-          </a:p>
-          <a:p>
-            <a:r>
-              <a:rPr lang="nl-BE" dirty="0" err="1"/>
-              <a:t>Notepad</a:t>
-            </a:r>
-            <a:r>
-              <a:rPr lang="nl-BE" dirty="0"/>
-              <a:t>++</a:t>
-            </a:r>
           </a:p>
         </p:txBody>
       </p:sp>
     </p:spTree>
     <p:extLst>
       <p:ext uri="{BB962C8B-B14F-4D97-AF65-F5344CB8AC3E}">
-        <p14:creationId xmlns:p14="http://schemas.microsoft.com/office/powerpoint/2010/main" val="2170463598"/>
+        <p14:creationId xmlns:p14="http://schemas.microsoft.com/office/powerpoint/2010/main" val="705310232"/>
       </p:ext>
     </p:extLst>
   </p:cSld>
   <p:clrMapOvr>
     <a:masterClrMapping/>
   </p:clrMapOvr>
+  <p:timing>
+    <p:tnLst>
+      <p:par>
+        <p:cTn id="1" dur="indefinite" restart="never" nodeType="tmRoot"/>
+      </p:par>
+    </p:tnLst>
+  </p:timing>
 </p:sld>
 </file>
 
@@ -4393,7 +4396,7 @@
           <p:cNvPr id="2" name="Titel 1">
             <a:extLst>
               <a:ext uri="{FF2B5EF4-FFF2-40B4-BE49-F238E27FC236}">
-                <a16:creationId xmlns:a16="http://schemas.microsoft.com/office/drawing/2014/main" id="{AFC54422-200F-390B-1E44-8D7F3C8BE92E}"/>
+                <a16:creationId xmlns:a16="http://schemas.microsoft.com/office/drawing/2014/main" xmlns="" id="{BE311A97-C066-5B05-482F-0E6FA4903BCF}"/>
               </a:ext>
             </a:extLst>
           </p:cNvPr>
@@ -4406,66 +4409,108 @@
         </p:nvSpPr>
         <p:spPr/>
         <p:txBody>
+          <a:bodyPr>
+            <a:normAutofit/>
+          </a:bodyPr>
+          <a:lstStyle/>
+          <a:p>
+            <a:r>
+              <a:rPr lang="nl-BE" sz="4800" dirty="0"/>
+              <a:t>Sprints</a:t>
+            </a:r>
+          </a:p>
+        </p:txBody>
+      </p:sp>
+      <p:pic>
+        <p:nvPicPr>
+          <p:cNvPr id="3" name="Tijdelijke aanduiding voor inhoud 2"/>
+          <p:cNvPicPr>
+            <a:picLocks noGrp="1" noChangeAspect="1"/>
+          </p:cNvPicPr>
+          <p:nvPr>
+            <p:ph idx="1"/>
+          </p:nvPr>
+        </p:nvPicPr>
+        <p:blipFill>
+          <a:blip r:embed="rId2"/>
+          <a:stretch>
+            <a:fillRect/>
+          </a:stretch>
+        </p:blipFill>
+        <p:spPr>
+          <a:xfrm>
+            <a:off x="4185499" y="594359"/>
+            <a:ext cx="7702203" cy="3605900"/>
+          </a:xfrm>
+          <a:prstGeom prst="rect">
+            <a:avLst/>
+          </a:prstGeom>
+        </p:spPr>
+      </p:pic>
+      <p:sp>
+        <p:nvSpPr>
+          <p:cNvPr id="5" name="Tijdelijke aanduiding voor tekst 4"/>
+          <p:cNvSpPr>
+            <a:spLocks noGrp="1"/>
+          </p:cNvSpPr>
+          <p:nvPr>
+            <p:ph type="body" sz="half" idx="2"/>
+          </p:nvPr>
+        </p:nvSpPr>
+        <p:spPr/>
+        <p:txBody>
           <a:bodyPr/>
           <a:lstStyle/>
           <a:p>
-            <a:r>
-              <a:rPr lang="nl-BE" dirty="0"/>
-              <a:t>Demo</a:t>
-            </a:r>
-          </a:p>
-        </p:txBody>
-      </p:sp>
-      <p:sp>
-        <p:nvSpPr>
-          <p:cNvPr id="3" name="Tijdelijke aanduiding voor inhoud 2">
-            <a:extLst>
-              <a:ext uri="{FF2B5EF4-FFF2-40B4-BE49-F238E27FC236}">
-                <a16:creationId xmlns:a16="http://schemas.microsoft.com/office/drawing/2014/main" id="{B0725605-6BF1-AB8E-4534-CF8AAC3DA7F6}"/>
-              </a:ext>
-            </a:extLst>
-          </p:cNvPr>
-          <p:cNvSpPr>
-            <a:spLocks noGrp="1"/>
-          </p:cNvSpPr>
-          <p:nvPr>
-            <p:ph idx="1"/>
-          </p:nvPr>
-        </p:nvSpPr>
-        <p:spPr/>
-        <p:txBody>
-          <a:bodyPr/>
-          <a:lstStyle/>
-          <a:p>
-            <a:r>
-              <a:rPr lang="nl-BE" dirty="0"/>
-              <a:t>Script</a:t>
-            </a:r>
-          </a:p>
-          <a:p>
-            <a:r>
-              <a:rPr lang="nl-BE" dirty="0"/>
-              <a:t>PXE-boot</a:t>
-            </a:r>
-          </a:p>
-          <a:p>
-            <a:r>
-              <a:rPr lang="nl-BE" dirty="0"/>
-              <a:t>Docker</a:t>
-            </a:r>
+            <a:pPr marL="285750" indent="-285750">
+              <a:buFont typeface="Arial" panose="020B0604020202020204" pitchFamily="34" charset="0"/>
+              <a:buChar char="•"/>
+            </a:pPr>
+            <a:r>
+              <a:rPr lang="nl-BE" dirty="0" smtClean="0"/>
+              <a:t>Installatie</a:t>
+            </a:r>
+          </a:p>
+          <a:p>
+            <a:pPr marL="285750" indent="-285750">
+              <a:buFont typeface="Arial" panose="020B0604020202020204" pitchFamily="34" charset="0"/>
+              <a:buChar char="•"/>
+            </a:pPr>
+            <a:r>
+              <a:rPr lang="nl-BE" dirty="0" smtClean="0"/>
+              <a:t>Stappenplan</a:t>
+            </a:r>
+          </a:p>
+          <a:p>
+            <a:pPr marL="285750" indent="-285750">
+              <a:buFont typeface="Arial" panose="020B0604020202020204" pitchFamily="34" charset="0"/>
+              <a:buChar char="•"/>
+            </a:pPr>
+            <a:r>
+              <a:rPr lang="nl-BE" dirty="0" smtClean="0"/>
+              <a:t>Hervatting uit vorige sprint</a:t>
+            </a:r>
+            <a:endParaRPr lang="nl-BE" dirty="0"/>
           </a:p>
         </p:txBody>
       </p:sp>
     </p:spTree>
     <p:extLst>
       <p:ext uri="{BB962C8B-B14F-4D97-AF65-F5344CB8AC3E}">
-        <p14:creationId xmlns:p14="http://schemas.microsoft.com/office/powerpoint/2010/main" val="2859215401"/>
+        <p14:creationId xmlns:p14="http://schemas.microsoft.com/office/powerpoint/2010/main" val="1519593788"/>
       </p:ext>
     </p:extLst>
   </p:cSld>
   <p:clrMapOvr>
     <a:masterClrMapping/>
   </p:clrMapOvr>
+  <p:timing>
+    <p:tnLst>
+      <p:par>
+        <p:cTn id="1" dur="indefinite" restart="never" nodeType="tmRoot"/>
+      </p:par>
+    </p:tnLst>
+  </p:timing>
 </p:sld>
 </file>
 
@@ -4491,7 +4536,7 @@
           <p:cNvPr id="2" name="Titel 1">
             <a:extLst>
               <a:ext uri="{FF2B5EF4-FFF2-40B4-BE49-F238E27FC236}">
-                <a16:creationId xmlns:a16="http://schemas.microsoft.com/office/drawing/2014/main" id="{6DCE6BC2-FCC8-1C7A-F5B9-58B298288E95}"/>
+                <a16:creationId xmlns:a16="http://schemas.microsoft.com/office/drawing/2014/main" xmlns="" id="{BE311A97-C066-5B05-482F-0E6FA4903BCF}"/>
               </a:ext>
             </a:extLst>
           </p:cNvPr>
@@ -4504,12 +4549,123 @@
         </p:nvSpPr>
         <p:spPr/>
         <p:txBody>
+          <a:bodyPr>
+            <a:normAutofit/>
+          </a:bodyPr>
+          <a:lstStyle/>
+          <a:p>
+            <a:r>
+              <a:rPr lang="nl-BE" sz="4800" dirty="0"/>
+              <a:t>Sprints</a:t>
+            </a:r>
+          </a:p>
+        </p:txBody>
+      </p:sp>
+      <p:pic>
+        <p:nvPicPr>
+          <p:cNvPr id="3" name="Tijdelijke aanduiding voor inhoud 2"/>
+          <p:cNvPicPr>
+            <a:picLocks noGrp="1" noChangeAspect="1"/>
+          </p:cNvPicPr>
+          <p:nvPr>
+            <p:ph idx="1"/>
+          </p:nvPr>
+        </p:nvPicPr>
+        <p:blipFill rotWithShape="1">
+          <a:blip r:embed="rId2"/>
+          <a:srcRect r="30670"/>
+          <a:stretch/>
+        </p:blipFill>
+        <p:spPr>
+          <a:xfrm>
+            <a:off x="4180491" y="594359"/>
+            <a:ext cx="6211926" cy="3827949"/>
+          </a:xfrm>
+          <a:prstGeom prst="rect">
+            <a:avLst/>
+          </a:prstGeom>
+        </p:spPr>
+      </p:pic>
+      <p:sp>
+        <p:nvSpPr>
+          <p:cNvPr id="5" name="Tijdelijke aanduiding voor tekst 4"/>
+          <p:cNvSpPr>
+            <a:spLocks noGrp="1"/>
+          </p:cNvSpPr>
+          <p:nvPr>
+            <p:ph type="body" sz="half" idx="2"/>
+          </p:nvPr>
+        </p:nvSpPr>
+        <p:spPr/>
+        <p:txBody>
           <a:bodyPr/>
           <a:lstStyle/>
           <a:p>
+            <a:endParaRPr lang="nl-BE" dirty="0"/>
+          </a:p>
+        </p:txBody>
+      </p:sp>
+    </p:spTree>
+    <p:extLst>
+      <p:ext uri="{BB962C8B-B14F-4D97-AF65-F5344CB8AC3E}">
+        <p14:creationId xmlns:p14="http://schemas.microsoft.com/office/powerpoint/2010/main" val="819422581"/>
+      </p:ext>
+    </p:extLst>
+  </p:cSld>
+  <p:clrMapOvr>
+    <a:masterClrMapping/>
+  </p:clrMapOvr>
+  <p:timing>
+    <p:tnLst>
+      <p:par>
+        <p:cTn id="1" dur="indefinite" restart="never" nodeType="tmRoot"/>
+      </p:par>
+    </p:tnLst>
+  </p:timing>
+</p:sld>
+</file>
+
+<file path=ppt/slides/slide13.xml><?xml version="1.0" encoding="utf-8"?>
+<p:sld xmlns:a="http://schemas.openxmlformats.org/drawingml/2006/main" xmlns:r="http://schemas.openxmlformats.org/officeDocument/2006/relationships" xmlns:p="http://schemas.openxmlformats.org/presentationml/2006/main">
+  <p:cSld>
+    <p:spTree>
+      <p:nvGrpSpPr>
+        <p:cNvPr id="1" name=""/>
+        <p:cNvGrpSpPr/>
+        <p:nvPr/>
+      </p:nvGrpSpPr>
+      <p:grpSpPr>
+        <a:xfrm>
+          <a:off x="0" y="0"/>
+          <a:ext cx="0" cy="0"/>
+          <a:chOff x="0" y="0"/>
+          <a:chExt cx="0" cy="0"/>
+        </a:xfrm>
+      </p:grpSpPr>
+      <p:sp>
+        <p:nvSpPr>
+          <p:cNvPr id="2" name="Titel 1">
+            <a:extLst>
+              <a:ext uri="{FF2B5EF4-FFF2-40B4-BE49-F238E27FC236}">
+                <a16:creationId xmlns:a16="http://schemas.microsoft.com/office/drawing/2014/main" xmlns="" id="{AEC34B59-0146-C33F-CFC6-890060B52779}"/>
+              </a:ext>
+            </a:extLst>
+          </p:cNvPr>
+          <p:cNvSpPr>
+            <a:spLocks noGrp="1"/>
+          </p:cNvSpPr>
+          <p:nvPr>
+            <p:ph type="title"/>
+          </p:nvPr>
+        </p:nvSpPr>
+        <p:spPr/>
+        <p:txBody>
+          <a:bodyPr/>
+          <a:lstStyle/>
+          <a:p>
             <a:r>
               <a:rPr lang="nl-BE" dirty="0"/>
-              <a:t>Besluit</a:t>
+              <a:t>Uitvoering</a:t>
             </a:r>
           </a:p>
         </p:txBody>
@@ -4519,7 +4675,221 @@
           <p:cNvPr id="3" name="Tijdelijke aanduiding voor inhoud 2">
             <a:extLst>
               <a:ext uri="{FF2B5EF4-FFF2-40B4-BE49-F238E27FC236}">
-                <a16:creationId xmlns:a16="http://schemas.microsoft.com/office/drawing/2014/main" id="{B963BFE1-6C82-E4C3-8482-D129FE7C6828}"/>
+                <a16:creationId xmlns:a16="http://schemas.microsoft.com/office/drawing/2014/main" xmlns="" id="{4BE4A8C1-501E-56ED-71C8-F32C29245B80}"/>
+              </a:ext>
+            </a:extLst>
+          </p:cNvPr>
+          <p:cNvSpPr>
+            <a:spLocks noGrp="1"/>
+          </p:cNvSpPr>
+          <p:nvPr>
+            <p:ph idx="1"/>
+          </p:nvPr>
+        </p:nvSpPr>
+        <p:spPr/>
+        <p:txBody>
+          <a:bodyPr/>
+          <a:lstStyle/>
+          <a:p>
+            <a:r>
+              <a:rPr lang="nl-BE" dirty="0" err="1"/>
+              <a:t>Github</a:t>
+            </a:r>
+            <a:endParaRPr lang="nl-BE" dirty="0"/>
+          </a:p>
+          <a:p>
+            <a:r>
+              <a:rPr lang="nl-BE" dirty="0"/>
+              <a:t>Visio</a:t>
+            </a:r>
+          </a:p>
+          <a:p>
+            <a:r>
+              <a:rPr lang="nl-BE" dirty="0"/>
+              <a:t>Python3</a:t>
+            </a:r>
+          </a:p>
+          <a:p>
+            <a:r>
+              <a:rPr lang="nl-BE" dirty="0" err="1"/>
+              <a:t>Notepad</a:t>
+            </a:r>
+            <a:r>
+              <a:rPr lang="nl-BE" dirty="0"/>
+              <a:t>++</a:t>
+            </a:r>
+          </a:p>
+        </p:txBody>
+      </p:sp>
+    </p:spTree>
+    <p:extLst>
+      <p:ext uri="{BB962C8B-B14F-4D97-AF65-F5344CB8AC3E}">
+        <p14:creationId xmlns:p14="http://schemas.microsoft.com/office/powerpoint/2010/main" val="2170463598"/>
+      </p:ext>
+    </p:extLst>
+  </p:cSld>
+  <p:clrMapOvr>
+    <a:masterClrMapping/>
+  </p:clrMapOvr>
+  <p:timing>
+    <p:tnLst>
+      <p:par>
+        <p:cTn id="1" dur="indefinite" restart="never" nodeType="tmRoot"/>
+      </p:par>
+    </p:tnLst>
+  </p:timing>
+</p:sld>
+</file>
+
+<file path=ppt/slides/slide14.xml><?xml version="1.0" encoding="utf-8"?>
+<p:sld xmlns:a="http://schemas.openxmlformats.org/drawingml/2006/main" xmlns:r="http://schemas.openxmlformats.org/officeDocument/2006/relationships" xmlns:p="http://schemas.openxmlformats.org/presentationml/2006/main">
+  <p:cSld>
+    <p:spTree>
+      <p:nvGrpSpPr>
+        <p:cNvPr id="1" name=""/>
+        <p:cNvGrpSpPr/>
+        <p:nvPr/>
+      </p:nvGrpSpPr>
+      <p:grpSpPr>
+        <a:xfrm>
+          <a:off x="0" y="0"/>
+          <a:ext cx="0" cy="0"/>
+          <a:chOff x="0" y="0"/>
+          <a:chExt cx="0" cy="0"/>
+        </a:xfrm>
+      </p:grpSpPr>
+      <p:sp>
+        <p:nvSpPr>
+          <p:cNvPr id="2" name="Titel 1">
+            <a:extLst>
+              <a:ext uri="{FF2B5EF4-FFF2-40B4-BE49-F238E27FC236}">
+                <a16:creationId xmlns:a16="http://schemas.microsoft.com/office/drawing/2014/main" xmlns="" id="{AFC54422-200F-390B-1E44-8D7F3C8BE92E}"/>
+              </a:ext>
+            </a:extLst>
+          </p:cNvPr>
+          <p:cNvSpPr>
+            <a:spLocks noGrp="1"/>
+          </p:cNvSpPr>
+          <p:nvPr>
+            <p:ph type="title"/>
+          </p:nvPr>
+        </p:nvSpPr>
+        <p:spPr/>
+        <p:txBody>
+          <a:bodyPr/>
+          <a:lstStyle/>
+          <a:p>
+            <a:r>
+              <a:rPr lang="nl-BE" dirty="0"/>
+              <a:t>Demo</a:t>
+            </a:r>
+          </a:p>
+        </p:txBody>
+      </p:sp>
+      <p:sp>
+        <p:nvSpPr>
+          <p:cNvPr id="3" name="Tijdelijke aanduiding voor inhoud 2">
+            <a:extLst>
+              <a:ext uri="{FF2B5EF4-FFF2-40B4-BE49-F238E27FC236}">
+                <a16:creationId xmlns:a16="http://schemas.microsoft.com/office/drawing/2014/main" xmlns="" id="{B0725605-6BF1-AB8E-4534-CF8AAC3DA7F6}"/>
+              </a:ext>
+            </a:extLst>
+          </p:cNvPr>
+          <p:cNvSpPr>
+            <a:spLocks noGrp="1"/>
+          </p:cNvSpPr>
+          <p:nvPr>
+            <p:ph idx="1"/>
+          </p:nvPr>
+        </p:nvSpPr>
+        <p:spPr/>
+        <p:txBody>
+          <a:bodyPr/>
+          <a:lstStyle/>
+          <a:p>
+            <a:r>
+              <a:rPr lang="nl-BE" dirty="0"/>
+              <a:t>Script</a:t>
+            </a:r>
+          </a:p>
+          <a:p>
+            <a:r>
+              <a:rPr lang="nl-BE" dirty="0"/>
+              <a:t>PXE-boot</a:t>
+            </a:r>
+          </a:p>
+          <a:p>
+            <a:r>
+              <a:rPr lang="nl-BE" dirty="0"/>
+              <a:t>Docker</a:t>
+            </a:r>
+          </a:p>
+        </p:txBody>
+      </p:sp>
+    </p:spTree>
+    <p:extLst>
+      <p:ext uri="{BB962C8B-B14F-4D97-AF65-F5344CB8AC3E}">
+        <p14:creationId xmlns:p14="http://schemas.microsoft.com/office/powerpoint/2010/main" val="2859215401"/>
+      </p:ext>
+    </p:extLst>
+  </p:cSld>
+  <p:clrMapOvr>
+    <a:masterClrMapping/>
+  </p:clrMapOvr>
+</p:sld>
+</file>
+
+<file path=ppt/slides/slide15.xml><?xml version="1.0" encoding="utf-8"?>
+<p:sld xmlns:a="http://schemas.openxmlformats.org/drawingml/2006/main" xmlns:r="http://schemas.openxmlformats.org/officeDocument/2006/relationships" xmlns:p="http://schemas.openxmlformats.org/presentationml/2006/main">
+  <p:cSld>
+    <p:spTree>
+      <p:nvGrpSpPr>
+        <p:cNvPr id="1" name=""/>
+        <p:cNvGrpSpPr/>
+        <p:nvPr/>
+      </p:nvGrpSpPr>
+      <p:grpSpPr>
+        <a:xfrm>
+          <a:off x="0" y="0"/>
+          <a:ext cx="0" cy="0"/>
+          <a:chOff x="0" y="0"/>
+          <a:chExt cx="0" cy="0"/>
+        </a:xfrm>
+      </p:grpSpPr>
+      <p:sp>
+        <p:nvSpPr>
+          <p:cNvPr id="2" name="Titel 1">
+            <a:extLst>
+              <a:ext uri="{FF2B5EF4-FFF2-40B4-BE49-F238E27FC236}">
+                <a16:creationId xmlns:a16="http://schemas.microsoft.com/office/drawing/2014/main" xmlns="" id="{6DCE6BC2-FCC8-1C7A-F5B9-58B298288E95}"/>
+              </a:ext>
+            </a:extLst>
+          </p:cNvPr>
+          <p:cNvSpPr>
+            <a:spLocks noGrp="1"/>
+          </p:cNvSpPr>
+          <p:nvPr>
+            <p:ph type="title"/>
+          </p:nvPr>
+        </p:nvSpPr>
+        <p:spPr/>
+        <p:txBody>
+          <a:bodyPr/>
+          <a:lstStyle/>
+          <a:p>
+            <a:r>
+              <a:rPr lang="nl-BE" dirty="0"/>
+              <a:t>Besluit</a:t>
+            </a:r>
+          </a:p>
+        </p:txBody>
+      </p:sp>
+      <p:sp>
+        <p:nvSpPr>
+          <p:cNvPr id="3" name="Tijdelijke aanduiding voor inhoud 2">
+            <a:extLst>
+              <a:ext uri="{FF2B5EF4-FFF2-40B4-BE49-F238E27FC236}">
+                <a16:creationId xmlns:a16="http://schemas.microsoft.com/office/drawing/2014/main" xmlns="" id="{B963BFE1-6C82-E4C3-8482-D129FE7C6828}"/>
               </a:ext>
             </a:extLst>
           </p:cNvPr>
@@ -4686,6 +5056,13 @@
   <p:clrMapOvr>
     <a:masterClrMapping/>
   </p:clrMapOvr>
+  <p:timing>
+    <p:tnLst>
+      <p:par>
+        <p:cTn id="1" dur="indefinite" restart="never" nodeType="tmRoot"/>
+      </p:par>
+    </p:tnLst>
+  </p:timing>
 </p:sld>
 </file>
 
@@ -4824,6 +5201,13 @@
   <p:clrMapOvr>
     <a:masterClrMapping/>
   </p:clrMapOvr>
+  <p:timing>
+    <p:tnLst>
+      <p:par>
+        <p:cTn id="1" dur="indefinite" restart="never" nodeType="tmRoot"/>
+      </p:par>
+    </p:tnLst>
+  </p:timing>
 </p:sld>
 </file>
 
@@ -4849,7 +5233,7 @@
           <p:cNvPr id="2" name="Titel 1">
             <a:extLst>
               <a:ext uri="{FF2B5EF4-FFF2-40B4-BE49-F238E27FC236}">
-                <a16:creationId xmlns:a16="http://schemas.microsoft.com/office/drawing/2014/main" id="{33BEE258-CFBD-51A6-AC0F-ED8F49AD3195}"/>
+                <a16:creationId xmlns:a16="http://schemas.microsoft.com/office/drawing/2014/main" xmlns="" id="{33BEE258-CFBD-51A6-AC0F-ED8F49AD3195}"/>
               </a:ext>
             </a:extLst>
           </p:cNvPr>
@@ -4877,7 +5261,7 @@
           <p:cNvPr id="3" name="Tijdelijke aanduiding voor inhoud 2">
             <a:extLst>
               <a:ext uri="{FF2B5EF4-FFF2-40B4-BE49-F238E27FC236}">
-                <a16:creationId xmlns:a16="http://schemas.microsoft.com/office/drawing/2014/main" id="{2B9BF8CB-C2D6-51EE-2634-6D720262DB13}"/>
+                <a16:creationId xmlns:a16="http://schemas.microsoft.com/office/drawing/2014/main" xmlns="" id="{2B9BF8CB-C2D6-51EE-2634-6D720262DB13}"/>
               </a:ext>
             </a:extLst>
           </p:cNvPr>
@@ -4960,6 +5344,13 @@
   <p:clrMapOvr>
     <a:masterClrMapping/>
   </p:clrMapOvr>
+  <p:timing>
+    <p:tnLst>
+      <p:par>
+        <p:cTn id="1" dur="indefinite" restart="never" nodeType="tmRoot"/>
+      </p:par>
+    </p:tnLst>
+  </p:timing>
 </p:sld>
 </file>
 
@@ -4993,10 +5384,10 @@
           <p:cNvPr id="12" name="Rectangle 11">
             <a:extLst>
               <a:ext uri="{FF2B5EF4-FFF2-40B4-BE49-F238E27FC236}">
-                <a16:creationId xmlns:a16="http://schemas.microsoft.com/office/drawing/2014/main" id="{284B70D5-875B-433D-BDBD-1522A85D6C1D}"/>
+                <a16:creationId xmlns:a16="http://schemas.microsoft.com/office/drawing/2014/main" xmlns="" id="{284B70D5-875B-433D-BDBD-1522A85D6C1D}"/>
               </a:ext>
               <a:ext uri="{C183D7F6-B498-43B3-948B-1728B52AA6E4}">
-                <adec:decorative xmlns:adec="http://schemas.microsoft.com/office/drawing/2017/decorative" val="1"/>
+                <adec:decorative xmlns:adec="http://schemas.microsoft.com/office/drawing/2017/decorative" xmlns="" val="1"/>
               </a:ext>
             </a:extLst>
           </p:cNvPr>
@@ -5006,7 +5397,7 @@
           <p:nvPr>
             <p:extLst>
               <p:ext uri="{386F3935-93C4-4BCD-93E2-E3B085C9AB24}">
-                <p16:designElem xmlns:p16="http://schemas.microsoft.com/office/powerpoint/2015/main" val="1"/>
+                <p16:designElem xmlns:p16="http://schemas.microsoft.com/office/powerpoint/2015/main" xmlns="" val="1"/>
               </p:ext>
             </p:extLst>
           </p:nvPr>
@@ -5053,7 +5444,7 @@
           <p:cNvPr id="2" name="Titel 1">
             <a:extLst>
               <a:ext uri="{FF2B5EF4-FFF2-40B4-BE49-F238E27FC236}">
-                <a16:creationId xmlns:a16="http://schemas.microsoft.com/office/drawing/2014/main" id="{B0C36400-815D-ABB3-D6A1-0664CE5CBDA1}"/>
+                <a16:creationId xmlns:a16="http://schemas.microsoft.com/office/drawing/2014/main" xmlns="" id="{B0C36400-815D-ABB3-D6A1-0664CE5CBDA1}"/>
               </a:ext>
             </a:extLst>
           </p:cNvPr>
@@ -5083,12 +5474,203 @@
           </a:p>
         </p:txBody>
       </p:sp>
+      <p:sp>
+        <p:nvSpPr>
+          <p:cNvPr id="9" name="Content Placeholder 8">
+            <a:extLst>
+              <a:ext uri="{FF2B5EF4-FFF2-40B4-BE49-F238E27FC236}">
+                <a16:creationId xmlns:a16="http://schemas.microsoft.com/office/drawing/2014/main" xmlns="" id="{1D5EF0D3-E098-4EEF-7F0B-6AE05CCE0B15}"/>
+              </a:ext>
+            </a:extLst>
+          </p:cNvPr>
+          <p:cNvSpPr>
+            <a:spLocks noGrp="1"/>
+          </p:cNvSpPr>
+          <p:nvPr>
+            <p:ph idx="1"/>
+          </p:nvPr>
+        </p:nvSpPr>
+        <p:spPr>
+          <a:xfrm>
+            <a:off x="7620001" y="2198914"/>
+            <a:ext cx="3929742" cy="3670180"/>
+          </a:xfrm>
+        </p:spPr>
+        <p:txBody>
+          <a:bodyPr>
+            <a:normAutofit lnSpcReduction="10000"/>
+          </a:bodyPr>
+          <a:lstStyle/>
+          <a:p>
+            <a:r>
+              <a:rPr lang="en-US" dirty="0"/>
+              <a:t>- </a:t>
+            </a:r>
+            <a:r>
+              <a:rPr lang="nl-BE" dirty="0"/>
+              <a:t>Geautomatiseerd</a:t>
+            </a:r>
+            <a:r>
+              <a:rPr lang="en-US" dirty="0"/>
+              <a:t> script:</a:t>
+            </a:r>
+          </a:p>
+          <a:p>
+            <a:r>
+              <a:rPr lang="en-US" dirty="0" err="1"/>
+              <a:t>Een</a:t>
+            </a:r>
+            <a:r>
+              <a:rPr lang="en-US" dirty="0"/>
+              <a:t> volledig </a:t>
+            </a:r>
+            <a:r>
+              <a:rPr lang="nl-BE" dirty="0"/>
+              <a:t>IP-adresseringsschema</a:t>
+            </a:r>
+            <a:r>
+              <a:rPr lang="en-US" dirty="0"/>
+              <a:t> </a:t>
+            </a:r>
+            <a:r>
+              <a:rPr lang="en-US" dirty="0" err="1"/>
+              <a:t>voor</a:t>
+            </a:r>
+            <a:r>
+              <a:rPr lang="en-US" dirty="0"/>
+              <a:t> alle devices </a:t>
+            </a:r>
+          </a:p>
+          <a:p>
+            <a:r>
+              <a:rPr lang="en-US" dirty="0"/>
+              <a:t>Config </a:t>
+            </a:r>
+            <a:r>
+              <a:rPr lang="en-US" dirty="0" err="1"/>
+              <a:t>voor</a:t>
+            </a:r>
+            <a:r>
+              <a:rPr lang="en-US" dirty="0"/>
+              <a:t> de routers </a:t>
+            </a:r>
+            <a:r>
+              <a:rPr lang="en-US" dirty="0" err="1"/>
+              <a:t>en</a:t>
+            </a:r>
+            <a:r>
+              <a:rPr lang="en-US" dirty="0"/>
+              <a:t> de switches</a:t>
+            </a:r>
+          </a:p>
+          <a:p>
+            <a:r>
+              <a:rPr lang="en-US" dirty="0"/>
+              <a:t>- Deployment services:</a:t>
+            </a:r>
+          </a:p>
+          <a:p>
+            <a:r>
+              <a:rPr lang="en-US" dirty="0"/>
+              <a:t>Via PXE-boot OS </a:t>
+            </a:r>
+            <a:r>
+              <a:rPr lang="en-US" dirty="0" err="1"/>
+              <a:t>pushen</a:t>
+            </a:r>
+            <a:r>
+              <a:rPr lang="en-US" dirty="0"/>
+              <a:t> </a:t>
+            </a:r>
+            <a:r>
+              <a:rPr lang="en-US" dirty="0" err="1"/>
+              <a:t>naar</a:t>
+            </a:r>
+            <a:r>
+              <a:rPr lang="en-US" dirty="0"/>
+              <a:t> de hosts pc’s</a:t>
+            </a:r>
+          </a:p>
+          <a:p>
+            <a:r>
+              <a:rPr lang="en-US" dirty="0"/>
+              <a:t>Via docker </a:t>
+            </a:r>
+            <a:r>
+              <a:rPr lang="en-US" dirty="0" err="1"/>
+              <a:t>een</a:t>
+            </a:r>
+            <a:r>
+              <a:rPr lang="en-US" dirty="0"/>
+              <a:t> image met </a:t>
+            </a:r>
+            <a:r>
+              <a:rPr lang="en-US" dirty="0" smtClean="0"/>
+              <a:t>python3 </a:t>
+            </a:r>
+            <a:r>
+              <a:rPr lang="en-US" dirty="0"/>
+              <a:t>software </a:t>
+            </a:r>
+            <a:r>
+              <a:rPr lang="en-US" dirty="0" err="1"/>
+              <a:t>pushen</a:t>
+            </a:r>
+            <a:endParaRPr lang="en-US" dirty="0"/>
+          </a:p>
+          <a:p>
+            <a:pPr marL="0" indent="0">
+              <a:buNone/>
+            </a:pPr>
+            <a:endParaRPr lang="en-US" dirty="0"/>
+          </a:p>
+          <a:p>
+            <a:pPr marL="0" indent="0">
+              <a:buNone/>
+            </a:pPr>
+            <a:endParaRPr lang="en-US" dirty="0"/>
+          </a:p>
+          <a:p>
+            <a:pPr marL="0" indent="0">
+              <a:buNone/>
+            </a:pPr>
+            <a:endParaRPr lang="en-US" dirty="0"/>
+          </a:p>
+          <a:p>
+            <a:pPr marL="0" indent="0">
+              <a:buNone/>
+            </a:pPr>
+            <a:endParaRPr lang="en-US" dirty="0"/>
+          </a:p>
+          <a:p>
+            <a:endParaRPr lang="en-US" dirty="0"/>
+          </a:p>
+          <a:p>
+            <a:endParaRPr lang="en-US" dirty="0"/>
+          </a:p>
+          <a:p>
+            <a:pPr marL="0" indent="0">
+              <a:buNone/>
+            </a:pPr>
+            <a:endParaRPr lang="en-US" dirty="0"/>
+          </a:p>
+          <a:p>
+            <a:pPr marL="0" indent="0">
+              <a:buNone/>
+            </a:pPr>
+            <a:endParaRPr lang="en-US" dirty="0"/>
+          </a:p>
+          <a:p>
+            <a:endParaRPr lang="en-US" dirty="0"/>
+          </a:p>
+        </p:txBody>
+      </p:sp>
       <p:pic>
         <p:nvPicPr>
           <p:cNvPr id="5" name="Tijdelijke aanduiding voor inhoud 4">
             <a:extLst>
               <a:ext uri="{FF2B5EF4-FFF2-40B4-BE49-F238E27FC236}">
-                <a16:creationId xmlns:a16="http://schemas.microsoft.com/office/drawing/2014/main" id="{1B53E411-4C23-54EA-5A09-67D623C2A0B7}"/>
+                <a16:creationId xmlns:a16="http://schemas.microsoft.com/office/drawing/2014/main" xmlns="" id="{1B53E411-4C23-54EA-5A09-67D623C2A0B7}"/>
               </a:ext>
             </a:extLst>
           </p:cNvPr>
@@ -5118,10 +5700,10 @@
           <p:cNvPr id="14" name="Straight Connector 13">
             <a:extLst>
               <a:ext uri="{FF2B5EF4-FFF2-40B4-BE49-F238E27FC236}">
-                <a16:creationId xmlns:a16="http://schemas.microsoft.com/office/drawing/2014/main" id="{C947DF4A-614C-4B4C-8B80-E5B9D8E8CFED}"/>
+                <a16:creationId xmlns:a16="http://schemas.microsoft.com/office/drawing/2014/main" xmlns="" id="{C947DF4A-614C-4B4C-8B80-E5B9D8E8CFED}"/>
               </a:ext>
               <a:ext uri="{C183D7F6-B498-43B3-948B-1728B52AA6E4}">
-                <adec:decorative xmlns:adec="http://schemas.microsoft.com/office/drawing/2017/decorative" val="1"/>
+                <adec:decorative xmlns:adec="http://schemas.microsoft.com/office/drawing/2017/decorative" xmlns="" val="1"/>
               </a:ext>
             </a:extLst>
           </p:cNvPr>
@@ -5131,7 +5713,7 @@
           <p:nvPr>
             <p:extLst>
               <p:ext uri="{386F3935-93C4-4BCD-93E2-E3B085C9AB24}">
-                <p16:designElem xmlns:p16="http://schemas.microsoft.com/office/powerpoint/2015/main" val="1"/>
+                <p16:designElem xmlns:p16="http://schemas.microsoft.com/office/powerpoint/2015/main" xmlns="" val="1"/>
               </p:ext>
             </p:extLst>
           </p:nvPr>
@@ -5171,206 +5753,23 @@
       </p:cxnSp>
       <p:sp>
         <p:nvSpPr>
-          <p:cNvPr id="9" name="Content Placeholder 8">
+          <p:cNvPr id="16" name="Rectangle 15">
             <a:extLst>
               <a:ext uri="{FF2B5EF4-FFF2-40B4-BE49-F238E27FC236}">
-                <a16:creationId xmlns:a16="http://schemas.microsoft.com/office/drawing/2014/main" id="{1D5EF0D3-E098-4EEF-7F0B-6AE05CCE0B15}"/>
+                <a16:creationId xmlns:a16="http://schemas.microsoft.com/office/drawing/2014/main" xmlns="" id="{1E299956-A9E7-4FC1-A0B1-D590CA9730E8}"/>
+              </a:ext>
+              <a:ext uri="{C183D7F6-B498-43B3-948B-1728B52AA6E4}">
+                <adec:decorative xmlns:adec="http://schemas.microsoft.com/office/drawing/2017/decorative" xmlns="" val="1"/>
               </a:ext>
             </a:extLst>
           </p:cNvPr>
           <p:cNvSpPr>
-            <a:spLocks noGrp="1"/>
-          </p:cNvSpPr>
-          <p:nvPr>
-            <p:ph idx="1"/>
-          </p:nvPr>
-        </p:nvSpPr>
-        <p:spPr>
-          <a:xfrm>
-            <a:off x="7620001" y="2198914"/>
-            <a:ext cx="3929742" cy="3670180"/>
-          </a:xfrm>
-        </p:spPr>
-        <p:txBody>
-          <a:bodyPr>
-            <a:normAutofit lnSpcReduction="10000"/>
-          </a:bodyPr>
-          <a:lstStyle/>
-          <a:p>
-            <a:r>
-              <a:rPr lang="en-US" dirty="0"/>
-              <a:t>- </a:t>
-            </a:r>
-            <a:r>
-              <a:rPr lang="nl-BE" dirty="0"/>
-              <a:t>Geautomatiseerd</a:t>
-            </a:r>
-            <a:r>
-              <a:rPr lang="en-US" dirty="0"/>
-              <a:t> script:</a:t>
-            </a:r>
-          </a:p>
-          <a:p>
-            <a:r>
-              <a:rPr lang="en-US" dirty="0" err="1"/>
-              <a:t>Een</a:t>
-            </a:r>
-            <a:r>
-              <a:rPr lang="en-US" dirty="0"/>
-              <a:t> volledig </a:t>
-            </a:r>
-            <a:r>
-              <a:rPr lang="nl-BE" dirty="0"/>
-              <a:t>IP-adresseringsschema</a:t>
-            </a:r>
-            <a:r>
-              <a:rPr lang="en-US" dirty="0"/>
-              <a:t> </a:t>
-            </a:r>
-            <a:r>
-              <a:rPr lang="en-US" dirty="0" err="1"/>
-              <a:t>voor</a:t>
-            </a:r>
-            <a:r>
-              <a:rPr lang="en-US" dirty="0"/>
-              <a:t> alle devices </a:t>
-            </a:r>
-          </a:p>
-          <a:p>
-            <a:r>
-              <a:rPr lang="en-US" dirty="0"/>
-              <a:t>Config </a:t>
-            </a:r>
-            <a:r>
-              <a:rPr lang="en-US" dirty="0" err="1"/>
-              <a:t>voor</a:t>
-            </a:r>
-            <a:r>
-              <a:rPr lang="en-US" dirty="0"/>
-              <a:t> de routers </a:t>
-            </a:r>
-            <a:r>
-              <a:rPr lang="en-US" dirty="0" err="1"/>
-              <a:t>en</a:t>
-            </a:r>
-            <a:r>
-              <a:rPr lang="en-US" dirty="0"/>
-              <a:t> de switches</a:t>
-            </a:r>
-          </a:p>
-          <a:p>
-            <a:r>
-              <a:rPr lang="en-US" dirty="0"/>
-              <a:t>- Deployment services:</a:t>
-            </a:r>
-          </a:p>
-          <a:p>
-            <a:r>
-              <a:rPr lang="en-US" dirty="0"/>
-              <a:t>Via PXE-boot OS </a:t>
-            </a:r>
-            <a:r>
-              <a:rPr lang="en-US" dirty="0" err="1"/>
-              <a:t>pushen</a:t>
-            </a:r>
-            <a:r>
-              <a:rPr lang="en-US" dirty="0"/>
-              <a:t> </a:t>
-            </a:r>
-            <a:r>
-              <a:rPr lang="en-US" dirty="0" err="1"/>
-              <a:t>naar</a:t>
-            </a:r>
-            <a:r>
-              <a:rPr lang="en-US" dirty="0"/>
-              <a:t> de hosts pc’s</a:t>
-            </a:r>
-          </a:p>
-          <a:p>
-            <a:r>
-              <a:rPr lang="en-US" dirty="0"/>
-              <a:t>Via docker </a:t>
-            </a:r>
-            <a:r>
-              <a:rPr lang="en-US" dirty="0" err="1"/>
-              <a:t>een</a:t>
-            </a:r>
-            <a:r>
-              <a:rPr lang="en-US" dirty="0"/>
-              <a:t> image met pyhon3 software </a:t>
-            </a:r>
-            <a:r>
-              <a:rPr lang="en-US" dirty="0" err="1"/>
-              <a:t>pushen</a:t>
-            </a:r>
-            <a:endParaRPr lang="en-US" dirty="0"/>
-          </a:p>
-          <a:p>
-            <a:pPr marL="0" indent="0">
-              <a:buNone/>
-            </a:pPr>
-            <a:endParaRPr lang="en-US" dirty="0"/>
-          </a:p>
-          <a:p>
-            <a:pPr marL="0" indent="0">
-              <a:buNone/>
-            </a:pPr>
-            <a:endParaRPr lang="en-US" dirty="0"/>
-          </a:p>
-          <a:p>
-            <a:pPr marL="0" indent="0">
-              <a:buNone/>
-            </a:pPr>
-            <a:endParaRPr lang="en-US" dirty="0"/>
-          </a:p>
-          <a:p>
-            <a:pPr marL="0" indent="0">
-              <a:buNone/>
-            </a:pPr>
-            <a:endParaRPr lang="en-US" dirty="0"/>
-          </a:p>
-          <a:p>
-            <a:endParaRPr lang="en-US" dirty="0"/>
-          </a:p>
-          <a:p>
-            <a:endParaRPr lang="en-US" dirty="0"/>
-          </a:p>
-          <a:p>
-            <a:pPr marL="0" indent="0">
-              <a:buNone/>
-            </a:pPr>
-            <a:endParaRPr lang="en-US" dirty="0"/>
-          </a:p>
-          <a:p>
-            <a:pPr marL="0" indent="0">
-              <a:buNone/>
-            </a:pPr>
-            <a:endParaRPr lang="en-US" dirty="0"/>
-          </a:p>
-          <a:p>
-            <a:endParaRPr lang="en-US" dirty="0"/>
-          </a:p>
-        </p:txBody>
-      </p:sp>
-      <p:sp>
-        <p:nvSpPr>
-          <p:cNvPr id="16" name="Rectangle 15">
-            <a:extLst>
-              <a:ext uri="{FF2B5EF4-FFF2-40B4-BE49-F238E27FC236}">
-                <a16:creationId xmlns:a16="http://schemas.microsoft.com/office/drawing/2014/main" id="{1E299956-A9E7-4FC1-A0B1-D590CA9730E8}"/>
-              </a:ext>
-              <a:ext uri="{C183D7F6-B498-43B3-948B-1728B52AA6E4}">
-                <adec:decorative xmlns:adec="http://schemas.microsoft.com/office/drawing/2017/decorative" val="1"/>
-              </a:ext>
-            </a:extLst>
-          </p:cNvPr>
-          <p:cNvSpPr>
             <a:spLocks noGrp="1" noRot="1" noChangeAspect="1" noMove="1" noResize="1" noEditPoints="1" noAdjustHandles="1" noChangeArrowheads="1" noChangeShapeType="1" noTextEdit="1"/>
           </p:cNvSpPr>
           <p:nvPr>
             <p:extLst>
               <p:ext uri="{386F3935-93C4-4BCD-93E2-E3B085C9AB24}">
-                <p16:designElem xmlns:p16="http://schemas.microsoft.com/office/powerpoint/2015/main" val="1"/>
+                <p16:designElem xmlns:p16="http://schemas.microsoft.com/office/powerpoint/2015/main" xmlns="" val="1"/>
               </p:ext>
             </p:extLst>
           </p:nvPr>
@@ -5412,10 +5811,10 @@
           <p:cNvPr id="18" name="Rectangle 17">
             <a:extLst>
               <a:ext uri="{FF2B5EF4-FFF2-40B4-BE49-F238E27FC236}">
-                <a16:creationId xmlns:a16="http://schemas.microsoft.com/office/drawing/2014/main" id="{17FC539C-B783-4B03-9F9E-D13430F3F64F}"/>
+                <a16:creationId xmlns:a16="http://schemas.microsoft.com/office/drawing/2014/main" xmlns="" id="{17FC539C-B783-4B03-9F9E-D13430F3F64F}"/>
               </a:ext>
               <a:ext uri="{C183D7F6-B498-43B3-948B-1728B52AA6E4}">
-                <adec:decorative xmlns:adec="http://schemas.microsoft.com/office/drawing/2017/decorative" val="1"/>
+                <adec:decorative xmlns:adec="http://schemas.microsoft.com/office/drawing/2017/decorative" xmlns="" val="1"/>
               </a:ext>
             </a:extLst>
           </p:cNvPr>
@@ -5425,7 +5824,7 @@
           <p:nvPr>
             <p:extLst>
               <p:ext uri="{386F3935-93C4-4BCD-93E2-E3B085C9AB24}">
-                <p16:designElem xmlns:p16="http://schemas.microsoft.com/office/powerpoint/2015/main" val="1"/>
+                <p16:designElem xmlns:p16="http://schemas.microsoft.com/office/powerpoint/2015/main" xmlns="" val="1"/>
               </p:ext>
             </p:extLst>
           </p:nvPr>
@@ -5472,6 +5871,13 @@
   <p:clrMapOvr>
     <a:masterClrMapping/>
   </p:clrMapOvr>
+  <p:timing>
+    <p:tnLst>
+      <p:par>
+        <p:cTn id="1" dur="indefinite" restart="never" nodeType="tmRoot"/>
+      </p:par>
+    </p:tnLst>
+  </p:timing>
 </p:sld>
 </file>
 
@@ -5505,7 +5911,7 @@
           <p:cNvPr id="2" name="Titel 1">
             <a:extLst>
               <a:ext uri="{FF2B5EF4-FFF2-40B4-BE49-F238E27FC236}">
-                <a16:creationId xmlns:a16="http://schemas.microsoft.com/office/drawing/2014/main" id="{3FE4B145-053D-E958-EC6A-D27D8DA621B8}"/>
+                <a16:creationId xmlns:a16="http://schemas.microsoft.com/office/drawing/2014/main" xmlns="" id="{3FE4B145-053D-E958-EC6A-D27D8DA621B8}"/>
               </a:ext>
             </a:extLst>
           </p:cNvPr>
@@ -5516,12 +5922,7 @@
             <p:ph type="title"/>
           </p:nvPr>
         </p:nvSpPr>
-        <p:spPr>
-          <a:xfrm>
-            <a:off x="1097280" y="286603"/>
-            <a:ext cx="10058400" cy="1450757"/>
-          </a:xfrm>
-        </p:spPr>
+        <p:spPr/>
         <p:txBody>
           <a:bodyPr vert="horz" lIns="91440" tIns="45720" rIns="91440" bIns="45720" rtlCol="0" anchor="b">
             <a:normAutofit/>
@@ -5540,7 +5941,7 @@
           <p:cNvPr id="8" name="Afbeelding 7" descr="Afbeelding met pijl&#10;&#10;Automatisch gegenereerde beschrijving">
             <a:extLst>
               <a:ext uri="{FF2B5EF4-FFF2-40B4-BE49-F238E27FC236}">
-                <a16:creationId xmlns:a16="http://schemas.microsoft.com/office/drawing/2014/main" id="{503873E3-C0B1-C2CC-8735-90E5C340BF23}"/>
+                <a16:creationId xmlns:a16="http://schemas.microsoft.com/office/drawing/2014/main" xmlns="" id="{503873E3-C0B1-C2CC-8735-90E5C340BF23}"/>
               </a:ext>
             </a:extLst>
           </p:cNvPr>
@@ -5570,7 +5971,7 @@
           <p:cNvPr id="9" name="Tekstvak 8">
             <a:extLst>
               <a:ext uri="{FF2B5EF4-FFF2-40B4-BE49-F238E27FC236}">
-                <a16:creationId xmlns:a16="http://schemas.microsoft.com/office/drawing/2014/main" id="{10962399-632C-FD8C-82C4-7D2939DD3448}"/>
+                <a16:creationId xmlns:a16="http://schemas.microsoft.com/office/drawing/2014/main" xmlns="" id="{10962399-632C-FD8C-82C4-7D2939DD3448}"/>
               </a:ext>
             </a:extLst>
           </p:cNvPr>
@@ -5703,7 +6104,7 @@
           <p:cNvPr id="5" name="Tekstvak 4">
             <a:extLst>
               <a:ext uri="{FF2B5EF4-FFF2-40B4-BE49-F238E27FC236}">
-                <a16:creationId xmlns:a16="http://schemas.microsoft.com/office/drawing/2014/main" id="{1516458D-F828-DAC5-E5D1-FC80439EA055}"/>
+                <a16:creationId xmlns:a16="http://schemas.microsoft.com/office/drawing/2014/main" xmlns="" id="{1516458D-F828-DAC5-E5D1-FC80439EA055}"/>
               </a:ext>
             </a:extLst>
           </p:cNvPr>
@@ -5772,7 +6173,7 @@
           <p:cNvPr id="6" name="Tekstvak 5">
             <a:extLst>
               <a:ext uri="{FF2B5EF4-FFF2-40B4-BE49-F238E27FC236}">
-                <a16:creationId xmlns:a16="http://schemas.microsoft.com/office/drawing/2014/main" id="{9F2329EE-DFDA-B646-F47C-5DB023F9E558}"/>
+                <a16:creationId xmlns:a16="http://schemas.microsoft.com/office/drawing/2014/main" xmlns="" id="{9F2329EE-DFDA-B646-F47C-5DB023F9E558}"/>
               </a:ext>
             </a:extLst>
           </p:cNvPr>
@@ -5843,7 +6244,7 @@
               <p14:cNvPr id="15" name="Inkt 14">
                 <a:extLst>
                   <a:ext uri="{FF2B5EF4-FFF2-40B4-BE49-F238E27FC236}">
-                    <a16:creationId xmlns:a16="http://schemas.microsoft.com/office/drawing/2014/main" id="{63E0BE64-5205-3BD9-7914-9297041A112D}"/>
+                    <a16:creationId xmlns:a16="http://schemas.microsoft.com/office/drawing/2014/main" xmlns="" id="{63E0BE64-5205-3BD9-7914-9297041A112D}"/>
                   </a:ext>
                 </a:extLst>
               </p14:cNvPr>
@@ -5892,7 +6293,7 @@
           <p:cNvPr id="28" name="Vermenigvuldigingsteken 27">
             <a:extLst>
               <a:ext uri="{FF2B5EF4-FFF2-40B4-BE49-F238E27FC236}">
-                <a16:creationId xmlns:a16="http://schemas.microsoft.com/office/drawing/2014/main" id="{386CB9B1-EED4-E14F-E121-8D65624C47CA}"/>
+                <a16:creationId xmlns:a16="http://schemas.microsoft.com/office/drawing/2014/main" xmlns="" id="{386CB9B1-EED4-E14F-E121-8D65624C47CA}"/>
               </a:ext>
             </a:extLst>
           </p:cNvPr>
@@ -6086,7 +6487,7 @@
           <p:cNvPr id="2" name="Titel 1">
             <a:extLst>
               <a:ext uri="{FF2B5EF4-FFF2-40B4-BE49-F238E27FC236}">
-                <a16:creationId xmlns:a16="http://schemas.microsoft.com/office/drawing/2014/main" id="{61222D61-FB80-136C-EA7C-4498181F5EC3}"/>
+                <a16:creationId xmlns:a16="http://schemas.microsoft.com/office/drawing/2014/main" xmlns="" id="{61222D61-FB80-136C-EA7C-4498181F5EC3}"/>
               </a:ext>
             </a:extLst>
           </p:cNvPr>
@@ -6114,7 +6515,7 @@
           <p:cNvPr id="5" name="Tijdelijke aanduiding voor inhoud 4">
             <a:extLst>
               <a:ext uri="{FF2B5EF4-FFF2-40B4-BE49-F238E27FC236}">
-                <a16:creationId xmlns:a16="http://schemas.microsoft.com/office/drawing/2014/main" id="{C0BB8812-5997-BA9A-BC40-7B96BCE35243}"/>
+                <a16:creationId xmlns:a16="http://schemas.microsoft.com/office/drawing/2014/main" xmlns="" id="{C0BB8812-5997-BA9A-BC40-7B96BCE35243}"/>
               </a:ext>
             </a:extLst>
           </p:cNvPr>
@@ -6133,8 +6534,8 @@
         </p:blipFill>
         <p:spPr>
           <a:xfrm>
-            <a:off x="2927926" y="1846263"/>
-            <a:ext cx="6465455" cy="4022725"/>
+            <a:off x="3036499" y="1846263"/>
+            <a:ext cx="6179328" cy="4022725"/>
           </a:xfrm>
         </p:spPr>
       </p:pic>
@@ -6145,7 +6546,7 @@
               <p:cNvPr id="6" name="Tekstvak 5">
                 <a:extLst>
                   <a:ext uri="{FF2B5EF4-FFF2-40B4-BE49-F238E27FC236}">
-                    <a16:creationId xmlns:a16="http://schemas.microsoft.com/office/drawing/2014/main" id="{D387BA67-91EC-14DF-53DC-C0240FB89E80}"/>
+                    <a16:creationId xmlns:a16="http://schemas.microsoft.com/office/drawing/2014/main" xmlns="" id="{D387BA67-91EC-14DF-53DC-C0240FB89E80}"/>
                   </a:ext>
                 </a:extLst>
               </p:cNvPr>
@@ -6175,7 +6576,7 @@
                       <m:jc m:val="centerGroup"/>
                     </m:oMathParaPr>
                     <m:oMath xmlns:m="http://schemas.openxmlformats.org/officeDocument/2006/math">
-                      <a:fld id="{825F15A7-03F4-43D7-82C5-3E23DA2F108C}" type="mathplaceholder">
+                      <a:fld id="{82C0B288-6902-49BA-88BB-FB8C319A6CD8}" type="mathplaceholder">
                         <a:rPr lang="nl-BE" i="1" smtClean="0">
                           <a:latin typeface="Cambria Math" panose="02040503050406030204" pitchFamily="18" charset="0"/>
                         </a:rPr>
@@ -6244,6 +6645,13 @@
   <p:clrMapOvr>
     <a:masterClrMapping/>
   </p:clrMapOvr>
+  <p:timing>
+    <p:tnLst>
+      <p:par>
+        <p:cTn id="1" dur="indefinite" restart="never" nodeType="tmRoot"/>
+      </p:par>
+    </p:tnLst>
+  </p:timing>
 </p:sld>
 </file>
 
@@ -6269,7 +6677,7 @@
           <p:cNvPr id="2" name="Titel 1">
             <a:extLst>
               <a:ext uri="{FF2B5EF4-FFF2-40B4-BE49-F238E27FC236}">
-                <a16:creationId xmlns:a16="http://schemas.microsoft.com/office/drawing/2014/main" id="{437CA3E9-E049-BF82-8256-9488B89D6579}"/>
+                <a16:creationId xmlns:a16="http://schemas.microsoft.com/office/drawing/2014/main" xmlns="" id="{437CA3E9-E049-BF82-8256-9488B89D6579}"/>
               </a:ext>
             </a:extLst>
           </p:cNvPr>
@@ -6297,7 +6705,7 @@
           <p:cNvPr id="3" name="Tijdelijke aanduiding voor inhoud 2">
             <a:extLst>
               <a:ext uri="{FF2B5EF4-FFF2-40B4-BE49-F238E27FC236}">
-                <a16:creationId xmlns:a16="http://schemas.microsoft.com/office/drawing/2014/main" id="{78D28960-B765-7B25-FA04-FDD1ED45EF63}"/>
+                <a16:creationId xmlns:a16="http://schemas.microsoft.com/office/drawing/2014/main" xmlns="" id="{78D28960-B765-7B25-FA04-FDD1ED45EF63}"/>
               </a:ext>
             </a:extLst>
           </p:cNvPr>
@@ -6338,7 +6746,7 @@
           <p:cNvPr id="4" name="Tijdelijke aanduiding voor inhoud 4">
             <a:extLst>
               <a:ext uri="{FF2B5EF4-FFF2-40B4-BE49-F238E27FC236}">
-                <a16:creationId xmlns:a16="http://schemas.microsoft.com/office/drawing/2014/main" id="{5188A173-A41B-CD1D-B5BF-87529FB515BC}"/>
+                <a16:creationId xmlns:a16="http://schemas.microsoft.com/office/drawing/2014/main" xmlns="" id="{5188A173-A41B-CD1D-B5BF-87529FB515BC}"/>
               </a:ext>
             </a:extLst>
           </p:cNvPr>
@@ -6368,7 +6776,7 @@
           <p:cNvPr id="5" name="Afbeelding 4">
             <a:extLst>
               <a:ext uri="{FF2B5EF4-FFF2-40B4-BE49-F238E27FC236}">
-                <a16:creationId xmlns:a16="http://schemas.microsoft.com/office/drawing/2014/main" id="{B8F3C3C3-93B4-9255-2B12-269380A0EE2D}"/>
+                <a16:creationId xmlns:a16="http://schemas.microsoft.com/office/drawing/2014/main" xmlns="" id="{B8F3C3C3-93B4-9255-2B12-269380A0EE2D}"/>
               </a:ext>
             </a:extLst>
           </p:cNvPr>
@@ -6403,6 +6811,13 @@
   <p:clrMapOvr>
     <a:masterClrMapping/>
   </p:clrMapOvr>
+  <p:timing>
+    <p:tnLst>
+      <p:par>
+        <p:cTn id="1" dur="indefinite" restart="never" nodeType="tmRoot"/>
+      </p:par>
+    </p:tnLst>
+  </p:timing>
 </p:sld>
 </file>
 
@@ -6428,7 +6843,7 @@
           <p:cNvPr id="2" name="Titel 1">
             <a:extLst>
               <a:ext uri="{FF2B5EF4-FFF2-40B4-BE49-F238E27FC236}">
-                <a16:creationId xmlns:a16="http://schemas.microsoft.com/office/drawing/2014/main" id="{BE311A97-C066-5B05-482F-0E6FA4903BCF}"/>
+                <a16:creationId xmlns:a16="http://schemas.microsoft.com/office/drawing/2014/main" xmlns="" id="{BE311A97-C066-5B05-482F-0E6FA4903BCF}"/>
               </a:ext>
             </a:extLst>
           </p:cNvPr>
@@ -6439,40 +6854,105 @@
             <p:ph type="title"/>
           </p:nvPr>
         </p:nvSpPr>
-        <p:spPr/>
-        <p:txBody>
-          <a:bodyPr/>
-          <a:lstStyle/>
-          <a:p>
-            <a:r>
-              <a:rPr lang="nl-BE" dirty="0"/>
+        <p:spPr>
+          <a:xfrm>
+            <a:off x="457200" y="893379"/>
+            <a:ext cx="3200400" cy="1986980"/>
+          </a:xfrm>
+        </p:spPr>
+        <p:txBody>
+          <a:bodyPr>
+            <a:normAutofit/>
+          </a:bodyPr>
+          <a:lstStyle/>
+          <a:p>
+            <a:r>
+              <a:rPr lang="nl-BE" sz="4800" dirty="0"/>
               <a:t>Sprints</a:t>
             </a:r>
-          </a:p>
-        </p:txBody>
-      </p:sp>
-      <p:sp>
-        <p:nvSpPr>
-          <p:cNvPr id="3" name="Tijdelijke aanduiding voor inhoud 2">
+            <a:endParaRPr lang="nl-BE" sz="6000" dirty="0"/>
+          </a:p>
+        </p:txBody>
+      </p:sp>
+      <p:pic>
+        <p:nvPicPr>
+          <p:cNvPr id="7" name="Tijdelijke aanduiding voor inhoud 6"/>
+          <p:cNvPicPr>
+            <a:picLocks noGrp="1" noChangeAspect="1"/>
+          </p:cNvPicPr>
+          <p:nvPr>
+            <p:ph idx="1"/>
+          </p:nvPr>
+        </p:nvPicPr>
+        <p:blipFill rotWithShape="1">
+          <a:blip r:embed="rId2">
             <a:extLst>
-              <a:ext uri="{FF2B5EF4-FFF2-40B4-BE49-F238E27FC236}">
-                <a16:creationId xmlns:a16="http://schemas.microsoft.com/office/drawing/2014/main" id="{BBB5DA29-7692-24C6-BCFD-428E6A2BEB22}"/>
+              <a:ext uri="{28A0092B-C50C-407E-A947-70E740481C1C}">
+                <a14:useLocalDpi xmlns:a14="http://schemas.microsoft.com/office/drawing/2010/main" val="0"/>
               </a:ext>
             </a:extLst>
-          </p:cNvPr>
-          <p:cNvSpPr>
-            <a:spLocks noGrp="1"/>
-          </p:cNvSpPr>
-          <p:nvPr>
-            <p:ph idx="1"/>
+          </a:blip>
+          <a:srcRect l="1039" t="2175" r="8300" b="1410"/>
+          <a:stretch/>
+        </p:blipFill>
+        <p:spPr>
+          <a:xfrm>
+            <a:off x="4131971" y="177673"/>
+            <a:ext cx="7678164" cy="6409502"/>
+          </a:xfrm>
+        </p:spPr>
+      </p:pic>
+      <p:sp>
+        <p:nvSpPr>
+          <p:cNvPr id="5" name="Tijdelijke aanduiding voor tekst 4"/>
+          <p:cNvSpPr>
+            <a:spLocks noGrp="1"/>
+          </p:cNvSpPr>
+          <p:nvPr>
+            <p:ph type="body" sz="half" idx="2"/>
           </p:nvPr>
         </p:nvSpPr>
         <p:spPr/>
         <p:txBody>
-          <a:bodyPr/>
-          <a:lstStyle/>
-          <a:p>
-            <a:endParaRPr lang="nl-BE" dirty="0"/>
+          <a:bodyPr>
+            <a:normAutofit/>
+          </a:bodyPr>
+          <a:lstStyle/>
+          <a:p>
+            <a:pPr marL="285750" indent="-285750">
+              <a:buFont typeface="Arial" panose="020B0604020202020204" pitchFamily="34" charset="0"/>
+              <a:buChar char="•"/>
+            </a:pPr>
+            <a:r>
+              <a:rPr lang="nl-BE" sz="2000" dirty="0" smtClean="0"/>
+              <a:t>Sprint backlogs</a:t>
+            </a:r>
+          </a:p>
+          <a:p>
+            <a:pPr marL="285750" indent="-285750">
+              <a:buFont typeface="Arial" panose="020B0604020202020204" pitchFamily="34" charset="0"/>
+              <a:buChar char="•"/>
+            </a:pPr>
+            <a:r>
+              <a:rPr lang="nl-BE" sz="2000" dirty="0" smtClean="0"/>
+              <a:t>Definition of </a:t>
+            </a:r>
+            <a:r>
+              <a:rPr lang="nl-BE" sz="2000" dirty="0" err="1" smtClean="0"/>
+              <a:t>done</a:t>
+            </a:r>
+            <a:endParaRPr lang="nl-BE" sz="2000" dirty="0" smtClean="0"/>
+          </a:p>
+          <a:p>
+            <a:pPr marL="285750" indent="-285750">
+              <a:buFont typeface="Arial" panose="020B0604020202020204" pitchFamily="34" charset="0"/>
+              <a:buChar char="•"/>
+            </a:pPr>
+            <a:r>
+              <a:rPr lang="nl-BE" sz="2000" dirty="0" smtClean="0"/>
+              <a:t>Increment</a:t>
+            </a:r>
+            <a:endParaRPr lang="nl-BE" sz="2000" dirty="0"/>
           </a:p>
         </p:txBody>
       </p:sp>
@@ -6486,51 +6966,320 @@
   <p:clrMapOvr>
     <a:masterClrMapping/>
   </p:clrMapOvr>
+  <p:timing>
+    <p:tnLst>
+      <p:par>
+        <p:cTn id="1" dur="indefinite" restart="never" nodeType="tmRoot">
+          <p:childTnLst>
+            <p:seq concurrent="1" nextAc="seek">
+              <p:cTn id="2" dur="indefinite" nodeType="mainSeq">
+                <p:childTnLst>
+                  <p:par>
+                    <p:cTn id="3" fill="hold">
+                      <p:stCondLst>
+                        <p:cond delay="indefinite"/>
+                      </p:stCondLst>
+                      <p:childTnLst>
+                        <p:par>
+                          <p:cTn id="4" fill="hold">
+                            <p:stCondLst>
+                              <p:cond delay="0"/>
+                            </p:stCondLst>
+                            <p:childTnLst>
+                              <p:par>
+                                <p:cTn id="5" presetID="10" presetClass="entr" presetSubtype="0" fill="hold" nodeType="clickEffect">
+                                  <p:stCondLst>
+                                    <p:cond delay="0"/>
+                                  </p:stCondLst>
+                                  <p:childTnLst>
+                                    <p:set>
+                                      <p:cBhvr>
+                                        <p:cTn id="6" dur="1" fill="hold">
+                                          <p:stCondLst>
+                                            <p:cond delay="0"/>
+                                          </p:stCondLst>
+                                        </p:cTn>
+                                        <p:tgtEl>
+                                          <p:spTgt spid="7"/>
+                                        </p:tgtEl>
+                                        <p:attrNameLst>
+                                          <p:attrName>style.visibility</p:attrName>
+                                        </p:attrNameLst>
+                                      </p:cBhvr>
+                                      <p:to>
+                                        <p:strVal val="visible"/>
+                                      </p:to>
+                                    </p:set>
+                                    <p:animEffect transition="in" filter="fade">
+                                      <p:cBhvr>
+                                        <p:cTn id="7" dur="500"/>
+                                        <p:tgtEl>
+                                          <p:spTgt spid="7"/>
+                                        </p:tgtEl>
+                                      </p:cBhvr>
+                                    </p:animEffect>
+                                  </p:childTnLst>
+                                </p:cTn>
+                              </p:par>
+                            </p:childTnLst>
+                          </p:cTn>
+                        </p:par>
+                      </p:childTnLst>
+                    </p:cTn>
+                  </p:par>
+                  <p:par>
+                    <p:cTn id="8" fill="hold">
+                      <p:stCondLst>
+                        <p:cond delay="indefinite"/>
+                      </p:stCondLst>
+                      <p:childTnLst>
+                        <p:par>
+                          <p:cTn id="9" fill="hold">
+                            <p:stCondLst>
+                              <p:cond delay="0"/>
+                            </p:stCondLst>
+                            <p:childTnLst>
+                              <p:par>
+                                <p:cTn id="10" presetID="10" presetClass="entr" presetSubtype="0" fill="hold" grpId="0" nodeType="clickEffect">
+                                  <p:stCondLst>
+                                    <p:cond delay="0"/>
+                                  </p:stCondLst>
+                                  <p:childTnLst>
+                                    <p:set>
+                                      <p:cBhvr>
+                                        <p:cTn id="11" dur="1" fill="hold">
+                                          <p:stCondLst>
+                                            <p:cond delay="0"/>
+                                          </p:stCondLst>
+                                        </p:cTn>
+                                        <p:tgtEl>
+                                          <p:spTgt spid="5">
+                                            <p:txEl>
+                                              <p:pRg st="0" end="0"/>
+                                            </p:txEl>
+                                          </p:spTgt>
+                                        </p:tgtEl>
+                                        <p:attrNameLst>
+                                          <p:attrName>style.visibility</p:attrName>
+                                        </p:attrNameLst>
+                                      </p:cBhvr>
+                                      <p:to>
+                                        <p:strVal val="visible"/>
+                                      </p:to>
+                                    </p:set>
+                                    <p:animEffect transition="in" filter="fade">
+                                      <p:cBhvr>
+                                        <p:cTn id="12" dur="500"/>
+                                        <p:tgtEl>
+                                          <p:spTgt spid="5">
+                                            <p:txEl>
+                                              <p:pRg st="0" end="0"/>
+                                            </p:txEl>
+                                          </p:spTgt>
+                                        </p:tgtEl>
+                                      </p:cBhvr>
+                                    </p:animEffect>
+                                  </p:childTnLst>
+                                </p:cTn>
+                              </p:par>
+                            </p:childTnLst>
+                          </p:cTn>
+                        </p:par>
+                      </p:childTnLst>
+                    </p:cTn>
+                  </p:par>
+                  <p:par>
+                    <p:cTn id="13" fill="hold">
+                      <p:stCondLst>
+                        <p:cond delay="indefinite"/>
+                      </p:stCondLst>
+                      <p:childTnLst>
+                        <p:par>
+                          <p:cTn id="14" fill="hold">
+                            <p:stCondLst>
+                              <p:cond delay="0"/>
+                            </p:stCondLst>
+                            <p:childTnLst>
+                              <p:par>
+                                <p:cTn id="15" presetID="10" presetClass="entr" presetSubtype="0" fill="hold" grpId="0" nodeType="clickEffect">
+                                  <p:stCondLst>
+                                    <p:cond delay="0"/>
+                                  </p:stCondLst>
+                                  <p:childTnLst>
+                                    <p:set>
+                                      <p:cBhvr>
+                                        <p:cTn id="16" dur="1" fill="hold">
+                                          <p:stCondLst>
+                                            <p:cond delay="0"/>
+                                          </p:stCondLst>
+                                        </p:cTn>
+                                        <p:tgtEl>
+                                          <p:spTgt spid="5">
+                                            <p:txEl>
+                                              <p:pRg st="1" end="1"/>
+                                            </p:txEl>
+                                          </p:spTgt>
+                                        </p:tgtEl>
+                                        <p:attrNameLst>
+                                          <p:attrName>style.visibility</p:attrName>
+                                        </p:attrNameLst>
+                                      </p:cBhvr>
+                                      <p:to>
+                                        <p:strVal val="visible"/>
+                                      </p:to>
+                                    </p:set>
+                                    <p:animEffect transition="in" filter="fade">
+                                      <p:cBhvr>
+                                        <p:cTn id="17" dur="500"/>
+                                        <p:tgtEl>
+                                          <p:spTgt spid="5">
+                                            <p:txEl>
+                                              <p:pRg st="1" end="1"/>
+                                            </p:txEl>
+                                          </p:spTgt>
+                                        </p:tgtEl>
+                                      </p:cBhvr>
+                                    </p:animEffect>
+                                  </p:childTnLst>
+                                </p:cTn>
+                              </p:par>
+                            </p:childTnLst>
+                          </p:cTn>
+                        </p:par>
+                      </p:childTnLst>
+                    </p:cTn>
+                  </p:par>
+                  <p:par>
+                    <p:cTn id="18" fill="hold">
+                      <p:stCondLst>
+                        <p:cond delay="indefinite"/>
+                      </p:stCondLst>
+                      <p:childTnLst>
+                        <p:par>
+                          <p:cTn id="19" fill="hold">
+                            <p:stCondLst>
+                              <p:cond delay="0"/>
+                            </p:stCondLst>
+                            <p:childTnLst>
+                              <p:par>
+                                <p:cTn id="20" presetID="10" presetClass="entr" presetSubtype="0" fill="hold" grpId="0" nodeType="clickEffect">
+                                  <p:stCondLst>
+                                    <p:cond delay="0"/>
+                                  </p:stCondLst>
+                                  <p:childTnLst>
+                                    <p:set>
+                                      <p:cBhvr>
+                                        <p:cTn id="21" dur="1" fill="hold">
+                                          <p:stCondLst>
+                                            <p:cond delay="0"/>
+                                          </p:stCondLst>
+                                        </p:cTn>
+                                        <p:tgtEl>
+                                          <p:spTgt spid="5">
+                                            <p:txEl>
+                                              <p:pRg st="2" end="2"/>
+                                            </p:txEl>
+                                          </p:spTgt>
+                                        </p:tgtEl>
+                                        <p:attrNameLst>
+                                          <p:attrName>style.visibility</p:attrName>
+                                        </p:attrNameLst>
+                                      </p:cBhvr>
+                                      <p:to>
+                                        <p:strVal val="visible"/>
+                                      </p:to>
+                                    </p:set>
+                                    <p:animEffect transition="in" filter="fade">
+                                      <p:cBhvr>
+                                        <p:cTn id="22" dur="500"/>
+                                        <p:tgtEl>
+                                          <p:spTgt spid="5">
+                                            <p:txEl>
+                                              <p:pRg st="2" end="2"/>
+                                            </p:txEl>
+                                          </p:spTgt>
+                                        </p:tgtEl>
+                                      </p:cBhvr>
+                                    </p:animEffect>
+                                  </p:childTnLst>
+                                </p:cTn>
+                              </p:par>
+                            </p:childTnLst>
+                          </p:cTn>
+                        </p:par>
+                      </p:childTnLst>
+                    </p:cTn>
+                  </p:par>
+                </p:childTnLst>
+              </p:cTn>
+              <p:prevCondLst>
+                <p:cond evt="onPrev" delay="0">
+                  <p:tgtEl>
+                    <p:sldTgt/>
+                  </p:tgtEl>
+                </p:cond>
+              </p:prevCondLst>
+              <p:nextCondLst>
+                <p:cond evt="onNext" delay="0">
+                  <p:tgtEl>
+                    <p:sldTgt/>
+                  </p:tgtEl>
+                </p:cond>
+              </p:nextCondLst>
+            </p:seq>
+          </p:childTnLst>
+        </p:cTn>
+      </p:par>
+    </p:tnLst>
+    <p:bldLst>
+      <p:bldP spid="5" grpId="0" build="p"/>
+    </p:bldLst>
+  </p:timing>
 </p:sld>
 </file>
 
 <file path=ppt/theme/theme1.xml><?xml version="1.0" encoding="utf-8"?>
-<a:theme xmlns:a="http://schemas.openxmlformats.org/drawingml/2006/main" name="Retrospect">
+<a:theme xmlns:a="http://schemas.openxmlformats.org/drawingml/2006/main" name="Terugblik">
   <a:themeElements>
-    <a:clrScheme name="Retrospect">
+    <a:clrScheme name="Terugblik">
       <a:dk1>
-        <a:srgbClr val="000000"/>
+        <a:sysClr val="windowText" lastClr="000000"/>
       </a:dk1>
       <a:lt1>
         <a:sysClr val="window" lastClr="FFFFFF"/>
       </a:lt1>
       <a:dk2>
-        <a:srgbClr val="637052"/>
+        <a:srgbClr val="344068"/>
       </a:dk2>
       <a:lt2>
-        <a:srgbClr val="CCDDEA"/>
+        <a:srgbClr val="D9E0E6"/>
       </a:lt2>
       <a:accent1>
-        <a:srgbClr val="E48312"/>
+        <a:srgbClr val="1CADE4"/>
       </a:accent1>
       <a:accent2>
-        <a:srgbClr val="BD582C"/>
+        <a:srgbClr val="2683C6"/>
       </a:accent2>
       <a:accent3>
-        <a:srgbClr val="865640"/>
+        <a:srgbClr val="28C4CC"/>
       </a:accent3>
       <a:accent4>
-        <a:srgbClr val="9B8357"/>
+        <a:srgbClr val="42BA97"/>
       </a:accent4>
       <a:accent5>
-        <a:srgbClr val="C2BC80"/>
+        <a:srgbClr val="3E8853"/>
       </a:accent5>
       <a:accent6>
-        <a:srgbClr val="94A088"/>
+        <a:srgbClr val="62A39F"/>
       </a:accent6>
       <a:hlink>
-        <a:srgbClr val="2998E3"/>
+        <a:srgbClr val="6EAC1C"/>
       </a:hlink>
       <a:folHlink>
-        <a:srgbClr val="8C8C8C"/>
+        <a:srgbClr val="B26B02"/>
       </a:folHlink>
     </a:clrScheme>
-    <a:fontScheme name="Retrospect">
+    <a:fontScheme name="Terugblik">
       <a:majorFont>
         <a:latin typeface="Calibri Light" panose="020F0302020204030204"/>
         <a:ea typeface=""/>
@@ -6602,7 +7351,7 @@
         <a:font script="Geor" typeface="Sylfaen"/>
       </a:minorFont>
     </a:fontScheme>
-    <a:fmtScheme name="Retrospect">
+    <a:fmtScheme name="Terugblik">
       <a:fillStyleLst>
         <a:solidFill>
           <a:schemeClr val="phClr"/>
@@ -6766,7 +7515,7 @@
   <a:extraClrSchemeLst/>
   <a:extLst>
     <a:ext uri="{05A4C25C-085E-4340-85A3-A5531E510DB2}">
-      <thm15:themeFamily xmlns:thm15="http://schemas.microsoft.com/office/thememl/2012/main" name="Retrospect" id="{5F128B03-DCCA-4EEB-AB3B-CF2899314A46}" vid="{3F1AAB62-24C6-49D2-8E01-B56FAC9A3DCD}"/>
+      <thm15:themeFamily xmlns:thm15="http://schemas.microsoft.com/office/thememl/2012/main" name="Retrospect" id="{5F128B03-DCCA-4EEB-AB3B-CF2899314A46}" vid="{9CC26709-368C-4D72-9060-94E5B3FF3CD6}"/>
     </a:ext>
   </a:extLst>
 </a:theme>

</xml_diff>